<commit_message>
Minor fixes in presentation
</commit_message>
<xml_diff>
--- a/deque/appendix/deque. Устройство и реализация.pptx
+++ b/deque/appendix/deque. Устройство и реализация.pptx
@@ -267,7 +267,7 @@
           </a:bodyPr>
           <a:p>
             <a:pPr algn="r"/>
-            <a:fld id="{55D3E4FE-FF6B-4B34-BD43-33DF4D9B4EE1}" type="slidenum">
+            <a:fld id="{314D9E90-AF66-4088-B4F0-6AA9F575E439}" type="slidenum">
               <a:rPr b="0" lang="ru-RU" sz="1400" spc="-1" strike="noStrike">
                 <a:latin typeface="Times New Roman"/>
               </a:rPr>
@@ -315,7 +315,7 @@
         <p:spPr>
           <a:xfrm>
             <a:off x="380880" y="685800"/>
-            <a:ext cx="6094440" cy="3427560"/>
+            <a:ext cx="6094080" cy="3427200"/>
           </a:xfrm>
           <a:prstGeom prst="rect">
             <a:avLst/>
@@ -335,7 +335,7 @@
         <p:spPr>
           <a:xfrm>
             <a:off x="685800" y="4343400"/>
-            <a:ext cx="5484960" cy="4113360"/>
+            <a:ext cx="5484600" cy="4113000"/>
           </a:xfrm>
           <a:prstGeom prst="rect">
             <a:avLst/>
@@ -361,7 +361,7 @@
         <p:spPr>
           <a:xfrm>
             <a:off x="3884760" y="8685360"/>
-            <a:ext cx="2970360" cy="455760"/>
+            <a:ext cx="2970000" cy="455400"/>
           </a:xfrm>
           <a:prstGeom prst="rect">
             <a:avLst/>
@@ -387,7 +387,7 @@
                 <a:spcPct val="100000"/>
               </a:lnSpc>
             </a:pPr>
-            <a:fld id="{8020FF5F-0940-47D8-B1D9-A97F1FE02AE2}" type="slidenum">
+            <a:fld id="{C9DFB9F2-485D-4054-BC4E-EFF8187FF4AE}" type="slidenum">
               <a:rPr b="0" lang="en-US" sz="1200" spc="-1" strike="noStrike">
                 <a:solidFill>
                   <a:srgbClr val="000000"/>
@@ -5873,7 +5873,7 @@
         <p:spPr>
           <a:xfrm>
             <a:off x="0" y="743040"/>
-            <a:ext cx="9142560" cy="238680"/>
+            <a:ext cx="9142200" cy="238320"/>
           </a:xfrm>
           <a:prstGeom prst="rect">
             <a:avLst/>
@@ -5914,7 +5914,7 @@
         <p:spPr>
           <a:xfrm>
             <a:off x="0" y="777240"/>
-            <a:ext cx="9142560" cy="84240"/>
+            <a:ext cx="9142200" cy="83880"/>
           </a:xfrm>
           <a:prstGeom prst="rect">
             <a:avLst/>
@@ -5955,7 +5955,7 @@
         <p:spPr>
           <a:xfrm>
             <a:off x="0" y="4478400"/>
-            <a:ext cx="9142560" cy="663840"/>
+            <a:ext cx="9142200" cy="663480"/>
           </a:xfrm>
           <a:prstGeom prst="rect">
             <a:avLst/>
@@ -5996,7 +5996,7 @@
         <p:spPr>
           <a:xfrm>
             <a:off x="-9000" y="4539960"/>
-            <a:ext cx="2247840" cy="533520"/>
+            <a:ext cx="2247480" cy="533160"/>
           </a:xfrm>
           <a:prstGeom prst="rect">
             <a:avLst/>
@@ -6039,7 +6039,7 @@
         <p:spPr>
           <a:xfrm>
             <a:off x="2359080" y="4533120"/>
-            <a:ext cx="6783480" cy="533520"/>
+            <a:ext cx="6783120" cy="533160"/>
           </a:xfrm>
           <a:prstGeom prst="rect">
             <a:avLst/>
@@ -6341,7 +6341,7 @@
         <p:spPr>
           <a:xfrm>
             <a:off x="0" y="743040"/>
-            <a:ext cx="9142560" cy="238680"/>
+            <a:ext cx="9142200" cy="238320"/>
           </a:xfrm>
           <a:prstGeom prst="rect">
             <a:avLst/>
@@ -6382,7 +6382,7 @@
         <p:spPr>
           <a:xfrm>
             <a:off x="0" y="777240"/>
-            <a:ext cx="9142560" cy="84240"/>
+            <a:ext cx="9142200" cy="83880"/>
           </a:xfrm>
           <a:prstGeom prst="rect">
             <a:avLst/>
@@ -6423,7 +6423,7 @@
         <p:spPr>
           <a:xfrm>
             <a:off x="0" y="1143000"/>
-            <a:ext cx="9142560" cy="855720"/>
+            <a:ext cx="9142200" cy="855360"/>
           </a:xfrm>
           <a:prstGeom prst="rect">
             <a:avLst/>
@@ -6464,7 +6464,7 @@
         <p:spPr>
           <a:xfrm>
             <a:off x="0" y="1200240"/>
-            <a:ext cx="1293840" cy="741600"/>
+            <a:ext cx="1293480" cy="741240"/>
           </a:xfrm>
           <a:prstGeom prst="rect">
             <a:avLst/>
@@ -6507,7 +6507,7 @@
         <p:spPr>
           <a:xfrm>
             <a:off x="1371600" y="1200240"/>
-            <a:ext cx="7770960" cy="741600"/>
+            <a:ext cx="7770600" cy="741240"/>
           </a:xfrm>
           <a:prstGeom prst="rect">
             <a:avLst/>
@@ -6810,7 +6810,7 @@
         <p:spPr>
           <a:xfrm>
             <a:off x="0" y="743040"/>
-            <a:ext cx="9142560" cy="238680"/>
+            <a:ext cx="9142200" cy="238320"/>
           </a:xfrm>
           <a:prstGeom prst="rect">
             <a:avLst/>
@@ -6851,7 +6851,7 @@
         <p:spPr>
           <a:xfrm>
             <a:off x="0" y="777240"/>
-            <a:ext cx="9142560" cy="84240"/>
+            <a:ext cx="9142200" cy="83880"/>
           </a:xfrm>
           <a:prstGeom prst="rect">
             <a:avLst/>
@@ -6891,8 +6891,8 @@
         </p:nvSpPr>
         <p:spPr>
           <a:xfrm>
-            <a:off x="8571240" y="4875840"/>
-            <a:ext cx="571320" cy="266400"/>
+            <a:off x="8571240" y="4875480"/>
+            <a:ext cx="570960" cy="266400"/>
           </a:xfrm>
           <a:prstGeom prst="rect">
             <a:avLst/>
@@ -6918,7 +6918,7 @@
                 <a:spcPct val="100000"/>
               </a:lnSpc>
             </a:pPr>
-            <a:fld id="{164D052B-5D5C-4B9D-92EA-EE6C5BC3CC68}" type="slidenum">
+            <a:fld id="{B7F13A33-84CB-430D-A648-D51F641BD2AD}" type="slidenum">
               <a:rPr b="0" lang="en-US" sz="1050" spc="-1" strike="noStrike">
                 <a:solidFill>
                   <a:srgbClr val="000000"/>
@@ -7203,7 +7203,7 @@
         <p:spPr>
           <a:xfrm>
             <a:off x="0" y="743040"/>
-            <a:ext cx="9142560" cy="238680"/>
+            <a:ext cx="9142200" cy="238320"/>
           </a:xfrm>
           <a:prstGeom prst="rect">
             <a:avLst/>
@@ -7244,7 +7244,7 @@
         <p:spPr>
           <a:xfrm>
             <a:off x="0" y="777240"/>
-            <a:ext cx="9142560" cy="84240"/>
+            <a:ext cx="9142200" cy="83880"/>
           </a:xfrm>
           <a:prstGeom prst="rect">
             <a:avLst/>
@@ -7538,7 +7538,7 @@
         <p:spPr>
           <a:xfrm>
             <a:off x="76320" y="378720"/>
-            <a:ext cx="8990280" cy="1780200"/>
+            <a:ext cx="8989920" cy="1779840"/>
           </a:xfrm>
           <a:prstGeom prst="rect">
             <a:avLst/>
@@ -7599,7 +7599,7 @@
         <p:spPr>
           <a:xfrm>
             <a:off x="2362320" y="4537440"/>
-            <a:ext cx="6780240" cy="513000"/>
+            <a:ext cx="6779880" cy="512640"/>
           </a:xfrm>
           <a:prstGeom prst="rect">
             <a:avLst/>
@@ -7625,7 +7625,7 @@
         <p:spPr>
           <a:xfrm>
             <a:off x="0" y="4551480"/>
-            <a:ext cx="2208240" cy="513000"/>
+            <a:ext cx="2207880" cy="512640"/>
           </a:xfrm>
           <a:prstGeom prst="rect">
             <a:avLst/>
@@ -7740,7 +7740,7 @@
         <p:spPr>
           <a:xfrm>
             <a:off x="2451240" y="0"/>
-            <a:ext cx="4240080" cy="5142600"/>
+            <a:ext cx="4239720" cy="5142240"/>
           </a:xfrm>
           <a:prstGeom prst="rect">
             <a:avLst/>
@@ -7793,7 +7793,7 @@
         <p:spPr>
           <a:xfrm>
             <a:off x="1849680" y="0"/>
-            <a:ext cx="5443200" cy="5142600"/>
+            <a:ext cx="5442840" cy="5142240"/>
           </a:xfrm>
           <a:prstGeom prst="rect">
             <a:avLst/>
@@ -7846,7 +7846,7 @@
         <p:spPr>
           <a:xfrm>
             <a:off x="45000" y="0"/>
-            <a:ext cx="9052920" cy="5142600"/>
+            <a:ext cx="9052560" cy="5142240"/>
           </a:xfrm>
           <a:prstGeom prst="rect">
             <a:avLst/>
@@ -7899,7 +7899,7 @@
         <p:spPr>
           <a:xfrm>
             <a:off x="0" y="519840"/>
-            <a:ext cx="9142920" cy="4102920"/>
+            <a:ext cx="9142560" cy="4102560"/>
           </a:xfrm>
           <a:prstGeom prst="rect">
             <a:avLst/>
@@ -7952,7 +7952,7 @@
         <p:spPr>
           <a:xfrm>
             <a:off x="0" y="714960"/>
-            <a:ext cx="9142920" cy="3712680"/>
+            <a:ext cx="9142560" cy="3712320"/>
           </a:xfrm>
           <a:prstGeom prst="rect">
             <a:avLst/>
@@ -8005,7 +8005,7 @@
         <p:spPr>
           <a:xfrm>
             <a:off x="36360" y="786240"/>
-            <a:ext cx="9142920" cy="3713040"/>
+            <a:ext cx="9142560" cy="3712680"/>
           </a:xfrm>
           <a:prstGeom prst="rect">
             <a:avLst/>
@@ -8054,7 +8054,7 @@
         <p:spPr>
           <a:xfrm>
             <a:off x="2340000" y="2520000"/>
-            <a:ext cx="179640" cy="345240"/>
+            <a:ext cx="179280" cy="344880"/>
           </a:xfrm>
           <a:prstGeom prst="rect">
             <a:avLst/>
@@ -8080,7 +8080,7 @@
         <p:spPr>
           <a:xfrm>
             <a:off x="1440000" y="1260000"/>
-            <a:ext cx="179640" cy="345240"/>
+            <a:ext cx="179280" cy="344880"/>
           </a:xfrm>
           <a:prstGeom prst="rect">
             <a:avLst/>
@@ -8106,7 +8106,7 @@
         <p:spPr>
           <a:xfrm>
             <a:off x="1440000" y="1237320"/>
-            <a:ext cx="7558920" cy="741600"/>
+            <a:ext cx="7558560" cy="741240"/>
           </a:xfrm>
           <a:prstGeom prst="rect">
             <a:avLst/>
@@ -8157,7 +8157,7 @@
         <p:spPr>
           <a:xfrm>
             <a:off x="5580000" y="2160000"/>
-            <a:ext cx="179640" cy="345240"/>
+            <a:ext cx="179280" cy="344880"/>
           </a:xfrm>
           <a:prstGeom prst="rect">
             <a:avLst/>
@@ -8183,7 +8183,7 @@
         <p:spPr>
           <a:xfrm>
             <a:off x="2857320" y="2160000"/>
-            <a:ext cx="179640" cy="345240"/>
+            <a:ext cx="179280" cy="344880"/>
           </a:xfrm>
           <a:prstGeom prst="rect">
             <a:avLst/>
@@ -8209,7 +8209,7 @@
         <p:spPr>
           <a:xfrm>
             <a:off x="4500000" y="3960000"/>
-            <a:ext cx="179640" cy="345240"/>
+            <a:ext cx="179280" cy="344880"/>
           </a:xfrm>
           <a:prstGeom prst="rect">
             <a:avLst/>
@@ -8269,7 +8269,7 @@
         <p:spPr>
           <a:xfrm>
             <a:off x="0" y="13680"/>
-            <a:ext cx="8999280" cy="714600"/>
+            <a:ext cx="8998920" cy="714240"/>
           </a:xfrm>
           <a:prstGeom prst="rect">
             <a:avLst/>
@@ -8320,7 +8320,7 @@
         <p:spPr>
           <a:xfrm>
             <a:off x="67680" y="1068480"/>
-            <a:ext cx="3351600" cy="3843720"/>
+            <a:ext cx="3351240" cy="3843360"/>
           </a:xfrm>
           <a:prstGeom prst="rect">
             <a:avLst/>
@@ -9641,7 +9641,7 @@
         <p:spPr>
           <a:xfrm>
             <a:off x="4050360" y="1080000"/>
-            <a:ext cx="4588920" cy="3977640"/>
+            <a:ext cx="4588560" cy="3977280"/>
           </a:xfrm>
           <a:prstGeom prst="rect">
             <a:avLst/>
@@ -11396,7 +11396,7 @@
         <p:spPr>
           <a:xfrm>
             <a:off x="1440000" y="1237320"/>
-            <a:ext cx="7558920" cy="741600"/>
+            <a:ext cx="7558560" cy="741240"/>
           </a:xfrm>
           <a:prstGeom prst="rect">
             <a:avLst/>
@@ -11481,7 +11481,7 @@
         <p:spPr>
           <a:xfrm>
             <a:off x="0" y="13680"/>
-            <a:ext cx="8999280" cy="714600"/>
+            <a:ext cx="8998920" cy="714240"/>
           </a:xfrm>
           <a:prstGeom prst="rect">
             <a:avLst/>
@@ -11532,7 +11532,7 @@
         <p:spPr>
           <a:xfrm>
             <a:off x="67680" y="1068480"/>
-            <a:ext cx="3351600" cy="550800"/>
+            <a:ext cx="3351240" cy="550440"/>
           </a:xfrm>
           <a:prstGeom prst="rect">
             <a:avLst/>
@@ -11643,7 +11643,7 @@
         <p:spPr>
           <a:xfrm>
             <a:off x="4050360" y="1080000"/>
-            <a:ext cx="4588920" cy="2159280"/>
+            <a:ext cx="4588560" cy="2158920"/>
           </a:xfrm>
           <a:prstGeom prst="rect">
             <a:avLst/>
@@ -12351,7 +12351,7 @@
         <p:spPr>
           <a:xfrm>
             <a:off x="0" y="3461760"/>
-            <a:ext cx="4859280" cy="345600"/>
+            <a:ext cx="4858920" cy="345240"/>
           </a:xfrm>
           <a:prstGeom prst="rect">
             <a:avLst/>
@@ -12622,7 +12622,7 @@
         <p:spPr>
           <a:xfrm>
             <a:off x="0" y="3793680"/>
-            <a:ext cx="4319280" cy="601560"/>
+            <a:ext cx="4318920" cy="601200"/>
           </a:xfrm>
           <a:prstGeom prst="rect">
             <a:avLst/>
@@ -12713,7 +12713,7 @@
         <p:spPr>
           <a:xfrm>
             <a:off x="0" y="4396320"/>
-            <a:ext cx="4319280" cy="601560"/>
+            <a:ext cx="4318920" cy="601200"/>
           </a:xfrm>
           <a:prstGeom prst="rect">
             <a:avLst/>
@@ -12747,7 +12747,7 @@
                 <a:latin typeface="Arial"/>
                 <a:ea typeface="Microsoft YaHei"/>
               </a:rPr>
-              <a:t>chunks.emplace_back(list.begin()</a:t>
+              <a:t>chunks.emplace_back(list.begin() </a:t>
             </a:r>
             <a:r>
               <a:rPr b="0" lang="ru-RU" sz="1800" spc="-1" strike="noStrike">
@@ -12804,7 +12804,7 @@
         <p:spPr>
           <a:xfrm>
             <a:off x="4500000" y="3808080"/>
-            <a:ext cx="4319280" cy="345600"/>
+            <a:ext cx="4318920" cy="345240"/>
           </a:xfrm>
           <a:prstGeom prst="rect">
             <a:avLst/>
@@ -13035,7 +13035,7 @@
         <p:spPr>
           <a:xfrm>
             <a:off x="4500000" y="4333680"/>
-            <a:ext cx="4319280" cy="345600"/>
+            <a:ext cx="4318920" cy="345240"/>
           </a:xfrm>
           <a:prstGeom prst="rect">
             <a:avLst/>
@@ -13640,7 +13640,7 @@
         <p:spPr>
           <a:xfrm>
             <a:off x="2340000" y="2520000"/>
-            <a:ext cx="179640" cy="345240"/>
+            <a:ext cx="179280" cy="344880"/>
           </a:xfrm>
           <a:prstGeom prst="rect">
             <a:avLst/>
@@ -13666,7 +13666,7 @@
         <p:spPr>
           <a:xfrm>
             <a:off x="1440000" y="1260000"/>
-            <a:ext cx="179640" cy="345240"/>
+            <a:ext cx="179280" cy="344880"/>
           </a:xfrm>
           <a:prstGeom prst="rect">
             <a:avLst/>
@@ -13692,7 +13692,7 @@
         <p:spPr>
           <a:xfrm>
             <a:off x="1440000" y="1237320"/>
-            <a:ext cx="7558920" cy="741600"/>
+            <a:ext cx="7558560" cy="741240"/>
           </a:xfrm>
           <a:prstGeom prst="rect">
             <a:avLst/>
@@ -13743,7 +13743,7 @@
         <p:spPr>
           <a:xfrm>
             <a:off x="5580000" y="2160000"/>
-            <a:ext cx="179640" cy="345240"/>
+            <a:ext cx="179280" cy="344880"/>
           </a:xfrm>
           <a:prstGeom prst="rect">
             <a:avLst/>
@@ -13769,7 +13769,7 @@
         <p:spPr>
           <a:xfrm>
             <a:off x="2857320" y="2160000"/>
-            <a:ext cx="179640" cy="345240"/>
+            <a:ext cx="179280" cy="344880"/>
           </a:xfrm>
           <a:prstGeom prst="rect">
             <a:avLst/>
@@ -13795,7 +13795,7 @@
         <p:spPr>
           <a:xfrm>
             <a:off x="4500000" y="3960000"/>
-            <a:ext cx="179640" cy="345240"/>
+            <a:ext cx="179280" cy="344880"/>
           </a:xfrm>
           <a:prstGeom prst="rect">
             <a:avLst/>
@@ -13855,7 +13855,7 @@
         <p:spPr>
           <a:xfrm>
             <a:off x="0" y="14040"/>
-            <a:ext cx="8999280" cy="714600"/>
+            <a:ext cx="8998920" cy="714240"/>
           </a:xfrm>
           <a:prstGeom prst="rect">
             <a:avLst/>
@@ -13906,7 +13906,7 @@
         <p:spPr>
           <a:xfrm>
             <a:off x="0" y="1080000"/>
-            <a:ext cx="4499280" cy="2159280"/>
+            <a:ext cx="4498920" cy="2158920"/>
           </a:xfrm>
           <a:prstGeom prst="rect">
             <a:avLst/>
@@ -14297,7 +14297,7 @@
         <p:spPr>
           <a:xfrm>
             <a:off x="5580000" y="1080000"/>
-            <a:ext cx="3380400" cy="1113840"/>
+            <a:ext cx="3380040" cy="1113480"/>
           </a:xfrm>
           <a:prstGeom prst="rect">
             <a:avLst/>
@@ -14545,7 +14545,7 @@
         <p:spPr>
           <a:xfrm>
             <a:off x="0" y="3461760"/>
-            <a:ext cx="4499280" cy="345600"/>
+            <a:ext cx="4498920" cy="345240"/>
           </a:xfrm>
           <a:prstGeom prst="rect">
             <a:avLst/>
@@ -14796,7 +14796,7 @@
         <p:spPr>
           <a:xfrm>
             <a:off x="5220000" y="3461760"/>
-            <a:ext cx="3779280" cy="345600"/>
+            <a:ext cx="3778920" cy="345240"/>
           </a:xfrm>
           <a:prstGeom prst="rect">
             <a:avLst/>
@@ -15027,7 +15027,7 @@
         <p:spPr>
           <a:xfrm>
             <a:off x="0" y="3794040"/>
-            <a:ext cx="4319280" cy="601560"/>
+            <a:ext cx="4318920" cy="601200"/>
           </a:xfrm>
           <a:prstGeom prst="rect">
             <a:avLst/>
@@ -15078,7 +15078,7 @@
         <p:spPr>
           <a:xfrm>
             <a:off x="4860000" y="3808080"/>
-            <a:ext cx="3959280" cy="601560"/>
+            <a:ext cx="3958920" cy="601200"/>
           </a:xfrm>
           <a:prstGeom prst="rect">
             <a:avLst/>
@@ -15634,7 +15634,7 @@
         <p:spPr>
           <a:xfrm>
             <a:off x="0" y="14040"/>
-            <a:ext cx="8999280" cy="714600"/>
+            <a:ext cx="8998920" cy="714240"/>
           </a:xfrm>
           <a:prstGeom prst="rect">
             <a:avLst/>
@@ -15685,7 +15685,7 @@
         <p:spPr>
           <a:xfrm>
             <a:off x="0" y="1080000"/>
-            <a:ext cx="4859280" cy="3161160"/>
+            <a:ext cx="4858920" cy="3160800"/>
           </a:xfrm>
           <a:prstGeom prst="rect">
             <a:avLst/>
@@ -16366,7 +16366,7 @@
         <p:spPr>
           <a:xfrm>
             <a:off x="5580000" y="1080000"/>
-            <a:ext cx="3380400" cy="1113840"/>
+            <a:ext cx="3380040" cy="1113480"/>
           </a:xfrm>
           <a:prstGeom prst="rect">
             <a:avLst/>
@@ -16614,7 +16614,7 @@
         <p:spPr>
           <a:xfrm>
             <a:off x="0" y="3895560"/>
-            <a:ext cx="4499280" cy="345600"/>
+            <a:ext cx="4498920" cy="345240"/>
           </a:xfrm>
           <a:prstGeom prst="rect">
             <a:avLst/>
@@ -16865,7 +16865,7 @@
         <p:spPr>
           <a:xfrm>
             <a:off x="5040000" y="3895920"/>
-            <a:ext cx="4644000" cy="345600"/>
+            <a:ext cx="4643640" cy="345240"/>
           </a:xfrm>
           <a:prstGeom prst="rect">
             <a:avLst/>
@@ -17096,7 +17096,7 @@
         <p:spPr>
           <a:xfrm>
             <a:off x="0" y="4241880"/>
-            <a:ext cx="4319280" cy="359280"/>
+            <a:ext cx="4318920" cy="358920"/>
           </a:xfrm>
           <a:prstGeom prst="rect">
             <a:avLst/>
@@ -17147,7 +17147,7 @@
         <p:spPr>
           <a:xfrm>
             <a:off x="4716000" y="4241520"/>
-            <a:ext cx="4463640" cy="601560"/>
+            <a:ext cx="4463280" cy="601200"/>
           </a:xfrm>
           <a:prstGeom prst="rect">
             <a:avLst/>
@@ -17398,7 +17398,7 @@
         <p:spPr>
           <a:xfrm>
             <a:off x="0" y="4601880"/>
-            <a:ext cx="4319280" cy="359280"/>
+            <a:ext cx="4318920" cy="358920"/>
           </a:xfrm>
           <a:prstGeom prst="rect">
             <a:avLst/>
@@ -17449,7 +17449,7 @@
         <p:spPr>
           <a:xfrm>
             <a:off x="4356360" y="4618080"/>
-            <a:ext cx="4823280" cy="601560"/>
+            <a:ext cx="4822920" cy="601200"/>
           </a:xfrm>
           <a:prstGeom prst="rect">
             <a:avLst/>
@@ -17685,6 +17685,26 @@
               </a:rPr>
               <a:t>} }, left_idx = 6</a:t>
             </a:r>
+            <a:endParaRPr b="0" lang="ru-RU" sz="1500" spc="-1" strike="noStrike">
+              <a:latin typeface="Arial"/>
+            </a:endParaRPr>
+          </a:p>
+          <a:p>
+            <a:pPr>
+              <a:lnSpc>
+                <a:spcPct val="100000"/>
+              </a:lnSpc>
+            </a:pPr>
+            <a:endParaRPr b="0" lang="ru-RU" sz="1500" spc="-1" strike="noStrike">
+              <a:latin typeface="Arial"/>
+            </a:endParaRPr>
+          </a:p>
+          <a:p>
+            <a:pPr>
+              <a:lnSpc>
+                <a:spcPct val="100000"/>
+              </a:lnSpc>
+            </a:pPr>
             <a:endParaRPr b="0" lang="ru-RU" sz="1500" spc="-1" strike="noStrike">
               <a:latin typeface="Arial"/>
             </a:endParaRPr>
@@ -18103,7 +18123,7 @@
         <p:spPr>
           <a:xfrm>
             <a:off x="0" y="14040"/>
-            <a:ext cx="8999280" cy="714600"/>
+            <a:ext cx="8998920" cy="714240"/>
           </a:xfrm>
           <a:prstGeom prst="rect">
             <a:avLst/>
@@ -18154,7 +18174,7 @@
         <p:spPr>
           <a:xfrm>
             <a:off x="0" y="1080000"/>
-            <a:ext cx="4283280" cy="1625400"/>
+            <a:ext cx="4282920" cy="1625040"/>
           </a:xfrm>
           <a:prstGeom prst="rect">
             <a:avLst/>
@@ -18442,7 +18462,7 @@
         <p:spPr>
           <a:xfrm>
             <a:off x="0" y="3895560"/>
-            <a:ext cx="4499280" cy="345600"/>
+            <a:ext cx="4498920" cy="345240"/>
           </a:xfrm>
           <a:prstGeom prst="rect">
             <a:avLst/>
@@ -18693,7 +18713,7 @@
         <p:spPr>
           <a:xfrm>
             <a:off x="4500000" y="3881880"/>
-            <a:ext cx="4319280" cy="359280"/>
+            <a:ext cx="4318920" cy="358920"/>
           </a:xfrm>
           <a:prstGeom prst="rect">
             <a:avLst/>
@@ -18744,7 +18764,7 @@
         <p:spPr>
           <a:xfrm>
             <a:off x="4284000" y="1080000"/>
-            <a:ext cx="4859280" cy="1619280"/>
+            <a:ext cx="4858920" cy="1618920"/>
           </a:xfrm>
           <a:prstGeom prst="rect">
             <a:avLst/>
@@ -18965,7 +18985,7 @@
         <p:spPr>
           <a:xfrm>
             <a:off x="0" y="4241880"/>
-            <a:ext cx="4319280" cy="359280"/>
+            <a:ext cx="4318920" cy="358920"/>
           </a:xfrm>
           <a:prstGeom prst="rect">
             <a:avLst/>
@@ -19016,7 +19036,7 @@
         <p:spPr>
           <a:xfrm>
             <a:off x="0" y="4601520"/>
-            <a:ext cx="4319280" cy="359280"/>
+            <a:ext cx="4318920" cy="358920"/>
           </a:xfrm>
           <a:prstGeom prst="rect">
             <a:avLst/>
@@ -19372,7 +19392,7 @@
         <p:spPr>
           <a:xfrm>
             <a:off x="1440000" y="1237320"/>
-            <a:ext cx="7558920" cy="741600"/>
+            <a:ext cx="7558560" cy="741240"/>
           </a:xfrm>
           <a:prstGeom prst="rect">
             <a:avLst/>
@@ -19457,7 +19477,7 @@
         <p:spPr>
           <a:xfrm>
             <a:off x="0" y="13680"/>
-            <a:ext cx="8999280" cy="714600"/>
+            <a:ext cx="8998920" cy="714240"/>
           </a:xfrm>
           <a:prstGeom prst="rect">
             <a:avLst/>
@@ -19508,7 +19528,7 @@
         <p:spPr>
           <a:xfrm>
             <a:off x="0" y="1080360"/>
-            <a:ext cx="4283280" cy="1625400"/>
+            <a:ext cx="4282920" cy="1625040"/>
           </a:xfrm>
           <a:prstGeom prst="rect">
             <a:avLst/>
@@ -19622,17 +19642,17 @@
                 <a:latin typeface="Arial"/>
                 <a:ea typeface="DejaVu Sans"/>
               </a:rPr>
-              <a:t>return</a:t>
-            </a:r>
-            <a:r>
-              <a:rPr b="0" lang="ru-RU" sz="1800" spc="-1" strike="noStrike">
-                <a:solidFill>
-                  <a:srgbClr val="000000"/>
-                </a:solidFill>
-                <a:latin typeface="Arial"/>
-                <a:ea typeface="DejaVu Sans"/>
-              </a:rPr>
-              <a:t> (direction </a:t>
+              <a:t>if</a:t>
+            </a:r>
+            <a:r>
+              <a:rPr b="0" lang="ru-RU" sz="1800" spc="-1" strike="noStrike">
+                <a:solidFill>
+                  <a:srgbClr val="000000"/>
+                </a:solidFill>
+                <a:latin typeface="Arial"/>
+                <a:ea typeface="DejaVu Sans"/>
+              </a:rPr>
+              <a:t>(direction </a:t>
             </a:r>
             <a:r>
               <a:rPr b="0" lang="ru-RU" sz="1800" spc="-1" strike="noStrike">
@@ -19672,7 +19692,7 @@
                 <a:latin typeface="Arial"/>
                 <a:ea typeface="DejaVu Sans"/>
               </a:rPr>
-              <a:t>LEFT</a:t>
+              <a:t>LEFT) {</a:t>
             </a:r>
             <a:endParaRPr b="0" lang="ru-RU" sz="1800" spc="-1" strike="noStrike">
               <a:latin typeface="Arial"/>
@@ -19692,17 +19712,17 @@
                 <a:latin typeface="Arial"/>
                 <a:ea typeface="DejaVu Sans"/>
               </a:rPr>
-              <a:t>                </a:t>
-            </a:r>
-            <a:r>
-              <a:rPr b="0" lang="ru-RU" sz="1800" spc="-1" strike="noStrike">
-                <a:solidFill>
-                  <a:srgbClr val="666666"/>
-                </a:solidFill>
-                <a:latin typeface="Arial"/>
-                <a:ea typeface="DejaVu Sans"/>
-              </a:rPr>
-              <a:t>?</a:t>
+              <a:t>        </a:t>
+            </a:r>
+            <a:r>
+              <a:rPr b="0" lang="ru-RU" sz="1800" spc="-1" strike="noStrike">
+                <a:solidFill>
+                  <a:srgbClr val="008000"/>
+                </a:solidFill>
+                <a:latin typeface="Arial"/>
+                <a:ea typeface="DejaVu Sans"/>
+              </a:rPr>
+              <a:t>return</a:t>
             </a:r>
             <a:r>
               <a:rPr b="0" lang="ru-RU" sz="1800" spc="-1" strike="noStrike">
@@ -19743,6 +19763,16 @@
                 <a:ea typeface="DejaVu Sans"/>
               </a:rPr>
               <a:t>0</a:t>
+            </a:r>
+            <a:r>
+              <a:rPr b="0" lang="ru-RU" sz="1800" spc="-1" strike="noStrike">
+                <a:solidFill>
+                  <a:srgbClr val="000000"/>
+                </a:solidFill>
+                <a:latin typeface="Arial"/>
+                <a:ea typeface="DejaVu Sans"/>
+              </a:rPr>
+              <a:t>;</a:t>
             </a:r>
             <a:endParaRPr b="0" lang="ru-RU" sz="1800" spc="-1" strike="noStrike">
               <a:latin typeface="Arial"/>
@@ -19762,17 +19792,67 @@
                 <a:latin typeface="Arial"/>
                 <a:ea typeface="DejaVu Sans"/>
               </a:rPr>
-              <a:t>                </a:t>
-            </a:r>
-            <a:r>
-              <a:rPr b="0" lang="ru-RU" sz="1800" spc="-1" strike="noStrike">
-                <a:solidFill>
-                  <a:srgbClr val="666666"/>
-                </a:solidFill>
-                <a:latin typeface="Arial"/>
-                <a:ea typeface="DejaVu Sans"/>
-              </a:rPr>
-              <a:t>:</a:t>
+              <a:t>    </a:t>
+            </a:r>
+            <a:r>
+              <a:rPr b="0" lang="ru-RU" sz="1800" spc="-1" strike="noStrike">
+                <a:solidFill>
+                  <a:srgbClr val="000000"/>
+                </a:solidFill>
+                <a:latin typeface="Arial"/>
+                <a:ea typeface="DejaVu Sans"/>
+              </a:rPr>
+              <a:t>} </a:t>
+            </a:r>
+            <a:r>
+              <a:rPr b="0" lang="ru-RU" sz="1800" spc="-1" strike="noStrike">
+                <a:solidFill>
+                  <a:srgbClr val="008000"/>
+                </a:solidFill>
+                <a:latin typeface="Arial"/>
+                <a:ea typeface="DejaVu Sans"/>
+              </a:rPr>
+              <a:t>else</a:t>
+            </a:r>
+            <a:r>
+              <a:rPr b="0" lang="ru-RU" sz="1800" spc="-1" strike="noStrike">
+                <a:solidFill>
+                  <a:srgbClr val="000000"/>
+                </a:solidFill>
+                <a:latin typeface="Arial"/>
+                <a:ea typeface="DejaVu Sans"/>
+              </a:rPr>
+              <a:t> {</a:t>
+            </a:r>
+            <a:endParaRPr b="0" lang="ru-RU" sz="1800" spc="-1" strike="noStrike">
+              <a:latin typeface="Arial"/>
+            </a:endParaRPr>
+          </a:p>
+          <a:p>
+            <a:pPr>
+              <a:lnSpc>
+                <a:spcPct val="100000"/>
+              </a:lnSpc>
+            </a:pPr>
+            <a:r>
+              <a:rPr b="0" lang="ru-RU" sz="1800" spc="-1" strike="noStrike">
+                <a:solidFill>
+                  <a:srgbClr val="000000"/>
+                </a:solidFill>
+                <a:latin typeface="Arial"/>
+                <a:ea typeface="DejaVu Sans"/>
+              </a:rPr>
+              <a:t>        </a:t>
+            </a:r>
+            <a:r>
+              <a:rPr b="0" lang="ru-RU" sz="1800" spc="-1" strike="noStrike">
+                <a:solidFill>
+                  <a:srgbClr val="008000"/>
+                </a:solidFill>
+                <a:latin typeface="Arial"/>
+                <a:ea typeface="DejaVu Sans"/>
+              </a:rPr>
+              <a:t>return</a:t>
             </a:r>
             <a:r>
               <a:rPr b="0" lang="ru-RU" sz="1800" spc="-1" strike="noStrike">
@@ -19802,7 +19882,37 @@
                 <a:latin typeface="Arial"/>
                 <a:ea typeface="DejaVu Sans"/>
               </a:rPr>
-              <a:t> CHUNK_SIZE)</a:t>
+              <a:t> CHUNK_SIZE;</a:t>
+            </a:r>
+            <a:endParaRPr b="0" lang="ru-RU" sz="1800" spc="-1" strike="noStrike">
+              <a:latin typeface="Arial"/>
+            </a:endParaRPr>
+          </a:p>
+          <a:p>
+            <a:pPr>
+              <a:lnSpc>
+                <a:spcPct val="100000"/>
+              </a:lnSpc>
+            </a:pPr>
+            <a:r>
+              <a:rPr b="0" lang="ru-RU" sz="1800" spc="-1" strike="noStrike">
+                <a:solidFill>
+                  <a:srgbClr val="000000"/>
+                </a:solidFill>
+                <a:latin typeface="Arial"/>
+                <a:ea typeface="DejaVu Sans"/>
+              </a:rPr>
+              <a:t>    </a:t>
+            </a:r>
+            <a:r>
+              <a:rPr b="0" lang="ru-RU" sz="1800" spc="-1" strike="noStrike">
+                <a:solidFill>
+                  <a:srgbClr val="000000"/>
+                </a:solidFill>
+                <a:latin typeface="Arial"/>
+                <a:ea typeface="DejaVu Sans"/>
+              </a:rPr>
+              <a:t>}</a:t>
             </a:r>
             <a:endParaRPr b="0" lang="ru-RU" sz="1800" spc="-1" strike="noStrike">
               <a:latin typeface="Arial"/>
@@ -19868,8 +19978,8 @@
         </p:nvSpPr>
         <p:spPr>
           <a:xfrm>
-            <a:off x="4536360" y="1080000"/>
-            <a:ext cx="4463280" cy="2339640"/>
+            <a:off x="4392360" y="1080000"/>
+            <a:ext cx="4751640" cy="2339280"/>
           </a:xfrm>
           <a:prstGeom prst="rect">
             <a:avLst/>
@@ -19896,7 +20006,7 @@
               </a:lnSpc>
             </a:pPr>
             <a:r>
-              <a:rPr b="0" lang="ru-RU" sz="1400" spc="-1" strike="noStrike">
+              <a:rPr b="0" lang="ru-RU" sz="1600" spc="-1" strike="noStrike">
                 <a:solidFill>
                   <a:srgbClr val="b00040"/>
                 </a:solidFill>
@@ -19906,7 +20016,7 @@
               <a:t>void</a:t>
             </a:r>
             <a:r>
-              <a:rPr b="0" lang="ru-RU" sz="1400" spc="-1" strike="noStrike">
+              <a:rPr b="0" lang="ru-RU" sz="1600" spc="-1" strike="noStrike">
                 <a:solidFill>
                   <a:srgbClr val="000000"/>
                 </a:solidFill>
@@ -19916,7 +20026,7 @@
               <a:t> </a:t>
             </a:r>
             <a:r>
-              <a:rPr b="0" lang="ru-RU" sz="1400" spc="-1" strike="noStrike">
+              <a:rPr b="0" lang="ru-RU" sz="1600" spc="-1" strike="noStrike">
                 <a:solidFill>
                   <a:srgbClr val="0000ff"/>
                 </a:solidFill>
@@ -19926,7 +20036,7 @@
               <a:t>allocate</a:t>
             </a:r>
             <a:r>
-              <a:rPr b="0" lang="ru-RU" sz="1400" spc="-1" strike="noStrike">
+              <a:rPr b="0" lang="ru-RU" sz="1600" spc="-1" strike="noStrike">
                 <a:solidFill>
                   <a:srgbClr val="000000"/>
                 </a:solidFill>
@@ -19935,7 +20045,7 @@
               </a:rPr>
               <a:t>(Direction direction) {</a:t>
             </a:r>
-            <a:endParaRPr b="0" lang="ru-RU" sz="1400" spc="-1" strike="noStrike">
+            <a:endParaRPr b="0" lang="ru-RU" sz="1600" spc="-1" strike="noStrike">
               <a:latin typeface="Arial"/>
             </a:endParaRPr>
           </a:p>
@@ -19946,7 +20056,7 @@
               </a:lnSpc>
             </a:pPr>
             <a:r>
-              <a:rPr b="0" lang="ru-RU" sz="1400" spc="-1" strike="noStrike">
+              <a:rPr b="0" lang="ru-RU" sz="1600" spc="-1" strike="noStrike">
                 <a:solidFill>
                   <a:srgbClr val="000000"/>
                 </a:solidFill>
@@ -19956,7 +20066,7 @@
               <a:t>    </a:t>
             </a:r>
             <a:r>
-              <a:rPr b="0" lang="ru-RU" sz="1400" spc="-1" strike="noStrike">
+              <a:rPr b="0" lang="ru-RU" sz="1600" spc="-1" strike="noStrike">
                 <a:solidFill>
                   <a:srgbClr val="000000"/>
                 </a:solidFill>
@@ -19966,7 +20076,7 @@
               <a:t>std</a:t>
             </a:r>
             <a:r>
-              <a:rPr b="0" lang="ru-RU" sz="1400" spc="-1" strike="noStrike">
+              <a:rPr b="0" lang="ru-RU" sz="1600" spc="-1" strike="noStrike">
                 <a:solidFill>
                   <a:srgbClr val="666666"/>
                 </a:solidFill>
@@ -19976,7 +20086,7 @@
               <a:t>::</a:t>
             </a:r>
             <a:r>
-              <a:rPr b="0" lang="ru-RU" sz="1400" spc="-1" strike="noStrike">
+              <a:rPr b="0" lang="ru-RU" sz="1600" spc="-1" strike="noStrike">
                 <a:solidFill>
                   <a:srgbClr val="000000"/>
                 </a:solidFill>
@@ -19986,7 +20096,7 @@
               <a:t>vector</a:t>
             </a:r>
             <a:r>
-              <a:rPr b="0" lang="ru-RU" sz="1400" spc="-1" strike="noStrike">
+              <a:rPr b="0" lang="ru-RU" sz="1600" spc="-1" strike="noStrike">
                 <a:solidFill>
                   <a:srgbClr val="666666"/>
                 </a:solidFill>
@@ -19996,7 +20106,7 @@
               <a:t>&lt;</a:t>
             </a:r>
             <a:r>
-              <a:rPr b="0" lang="ru-RU" sz="1400" spc="-1" strike="noStrike">
+              <a:rPr b="0" lang="ru-RU" sz="1600" spc="-1" strike="noStrike">
                 <a:solidFill>
                   <a:srgbClr val="000000"/>
                 </a:solidFill>
@@ -20006,7 +20116,7 @@
               <a:t>T</a:t>
             </a:r>
             <a:r>
-              <a:rPr b="0" lang="ru-RU" sz="1400" spc="-1" strike="noStrike">
+              <a:rPr b="0" lang="ru-RU" sz="1600" spc="-1" strike="noStrike">
                 <a:solidFill>
                   <a:srgbClr val="666666"/>
                 </a:solidFill>
@@ -20016,7 +20126,7 @@
               <a:t>&gt;</a:t>
             </a:r>
             <a:r>
-              <a:rPr b="0" lang="ru-RU" sz="1400" spc="-1" strike="noStrike">
+              <a:rPr b="0" lang="ru-RU" sz="1600" spc="-1" strike="noStrike">
                 <a:solidFill>
                   <a:srgbClr val="000000"/>
                 </a:solidFill>
@@ -20025,7 +20135,7 @@
               </a:rPr>
               <a:t> new_chunk;</a:t>
             </a:r>
-            <a:endParaRPr b="0" lang="ru-RU" sz="1400" spc="-1" strike="noStrike">
+            <a:endParaRPr b="0" lang="ru-RU" sz="1600" spc="-1" strike="noStrike">
               <a:latin typeface="Arial"/>
             </a:endParaRPr>
           </a:p>
@@ -20036,7 +20146,7 @@
               </a:lnSpc>
             </a:pPr>
             <a:r>
-              <a:rPr b="0" lang="ru-RU" sz="1400" spc="-1" strike="noStrike">
+              <a:rPr b="0" lang="ru-RU" sz="1600" spc="-1" strike="noStrike">
                 <a:solidFill>
                   <a:srgbClr val="000000"/>
                 </a:solidFill>
@@ -20046,7 +20156,7 @@
               <a:t>    </a:t>
             </a:r>
             <a:r>
-              <a:rPr b="0" lang="ru-RU" sz="1400" spc="-1" strike="noStrike">
+              <a:rPr b="0" lang="ru-RU" sz="1600" spc="-1" strike="noStrike">
                 <a:solidFill>
                   <a:srgbClr val="000000"/>
                 </a:solidFill>
@@ -20055,7 +20165,7 @@
               </a:rPr>
               <a:t>new_chunk.reserve(CHUNK_SIZE);</a:t>
             </a:r>
-            <a:endParaRPr b="0" lang="ru-RU" sz="1400" spc="-1" strike="noStrike">
+            <a:endParaRPr b="0" lang="ru-RU" sz="1600" spc="-1" strike="noStrike">
               <a:latin typeface="Arial"/>
             </a:endParaRPr>
           </a:p>
@@ -20066,7 +20176,7 @@
               </a:lnSpc>
             </a:pPr>
             <a:r>
-              <a:rPr b="0" lang="ru-RU" sz="1400" spc="-1" strike="noStrike">
+              <a:rPr b="0" lang="ru-RU" sz="1600" spc="-1" strike="noStrike">
                 <a:solidFill>
                   <a:srgbClr val="000000"/>
                 </a:solidFill>
@@ -20076,7 +20186,7 @@
               <a:t>    </a:t>
             </a:r>
             <a:r>
-              <a:rPr b="0" lang="ru-RU" sz="1400" spc="-1" strike="noStrike">
+              <a:rPr b="0" lang="ru-RU" sz="1600" spc="-1" strike="noStrike">
                 <a:solidFill>
                   <a:srgbClr val="008000"/>
                 </a:solidFill>
@@ -20086,7 +20196,7 @@
               <a:t>if</a:t>
             </a:r>
             <a:r>
-              <a:rPr b="0" lang="ru-RU" sz="1400" spc="-1" strike="noStrike">
+              <a:rPr b="0" lang="ru-RU" sz="1600" spc="-1" strike="noStrike">
                 <a:solidFill>
                   <a:srgbClr val="000000"/>
                 </a:solidFill>
@@ -20096,7 +20206,7 @@
               <a:t> (direction </a:t>
             </a:r>
             <a:r>
-              <a:rPr b="0" lang="ru-RU" sz="1400" spc="-1" strike="noStrike">
+              <a:rPr b="0" lang="ru-RU" sz="1600" spc="-1" strike="noStrike">
                 <a:solidFill>
                   <a:srgbClr val="666666"/>
                 </a:solidFill>
@@ -20106,7 +20216,7 @@
               <a:t>==</a:t>
             </a:r>
             <a:r>
-              <a:rPr b="0" lang="ru-RU" sz="1400" spc="-1" strike="noStrike">
+              <a:rPr b="0" lang="ru-RU" sz="1600" spc="-1" strike="noStrike">
                 <a:solidFill>
                   <a:srgbClr val="000000"/>
                 </a:solidFill>
@@ -20116,7 +20226,7 @@
               <a:t> Direction</a:t>
             </a:r>
             <a:r>
-              <a:rPr b="0" lang="ru-RU" sz="1400" spc="-1" strike="noStrike">
+              <a:rPr b="0" lang="ru-RU" sz="1600" spc="-1" strike="noStrike">
                 <a:solidFill>
                   <a:srgbClr val="666666"/>
                 </a:solidFill>
@@ -20126,7 +20236,7 @@
               <a:t>::</a:t>
             </a:r>
             <a:r>
-              <a:rPr b="0" lang="ru-RU" sz="1400" spc="-1" strike="noStrike">
+              <a:rPr b="0" lang="ru-RU" sz="1600" spc="-1" strike="noStrike">
                 <a:solidFill>
                   <a:srgbClr val="000000"/>
                 </a:solidFill>
@@ -20135,7 +20245,7 @@
               </a:rPr>
               <a:t>LEFT) {</a:t>
             </a:r>
-            <a:endParaRPr b="0" lang="ru-RU" sz="1400" spc="-1" strike="noStrike">
+            <a:endParaRPr b="0" lang="ru-RU" sz="1600" spc="-1" strike="noStrike">
               <a:latin typeface="Arial"/>
             </a:endParaRPr>
           </a:p>
@@ -20146,7 +20256,7 @@
               </a:lnSpc>
             </a:pPr>
             <a:r>
-              <a:rPr b="0" lang="ru-RU" sz="1400" spc="-1" strike="noStrike">
+              <a:rPr b="0" lang="ru-RU" sz="1600" spc="-1" strike="noStrike">
                 <a:solidFill>
                   <a:srgbClr val="000000"/>
                 </a:solidFill>
@@ -20156,7 +20266,7 @@
               <a:t>        </a:t>
             </a:r>
             <a:r>
-              <a:rPr b="0" lang="ru-RU" sz="1400" spc="-1" strike="noStrike">
+              <a:rPr b="0" lang="ru-RU" sz="1600" spc="-1" strike="noStrike">
                 <a:solidFill>
                   <a:srgbClr val="000000"/>
                 </a:solidFill>
@@ -20166,7 +20276,7 @@
               <a:t>chunks.insert(chunks.begin(), std</a:t>
             </a:r>
             <a:r>
-              <a:rPr b="0" lang="ru-RU" sz="1400" spc="-1" strike="noStrike">
+              <a:rPr b="0" lang="ru-RU" sz="1600" spc="-1" strike="noStrike">
                 <a:solidFill>
                   <a:srgbClr val="666666"/>
                 </a:solidFill>
@@ -20176,7 +20286,7 @@
               <a:t>::</a:t>
             </a:r>
             <a:r>
-              <a:rPr b="0" lang="ru-RU" sz="1400" spc="-1" strike="noStrike">
+              <a:rPr b="0" lang="ru-RU" sz="1600" spc="-1" strike="noStrike">
                 <a:solidFill>
                   <a:srgbClr val="000000"/>
                 </a:solidFill>
@@ -20185,7 +20295,7 @@
               </a:rPr>
               <a:t>move(new_chunk));</a:t>
             </a:r>
-            <a:endParaRPr b="0" lang="ru-RU" sz="1400" spc="-1" strike="noStrike">
+            <a:endParaRPr b="0" lang="ru-RU" sz="1600" spc="-1" strike="noStrike">
               <a:latin typeface="Arial"/>
             </a:endParaRPr>
           </a:p>
@@ -20196,7 +20306,7 @@
               </a:lnSpc>
             </a:pPr>
             <a:r>
-              <a:rPr b="0" lang="ru-RU" sz="1400" spc="-1" strike="noStrike">
+              <a:rPr b="0" lang="ru-RU" sz="1600" spc="-1" strike="noStrike">
                 <a:solidFill>
                   <a:srgbClr val="000000"/>
                 </a:solidFill>
@@ -20206,7 +20316,7 @@
               <a:t>    </a:t>
             </a:r>
             <a:r>
-              <a:rPr b="0" lang="ru-RU" sz="1400" spc="-1" strike="noStrike">
+              <a:rPr b="0" lang="ru-RU" sz="1600" spc="-1" strike="noStrike">
                 <a:solidFill>
                   <a:srgbClr val="000000"/>
                 </a:solidFill>
@@ -20216,7 +20326,7 @@
               <a:t>} </a:t>
             </a:r>
             <a:r>
-              <a:rPr b="0" lang="ru-RU" sz="1400" spc="-1" strike="noStrike">
+              <a:rPr b="0" lang="ru-RU" sz="1600" spc="-1" strike="noStrike">
                 <a:solidFill>
                   <a:srgbClr val="008000"/>
                 </a:solidFill>
@@ -20226,7 +20336,7 @@
               <a:t>else</a:t>
             </a:r>
             <a:r>
-              <a:rPr b="0" lang="ru-RU" sz="1400" spc="-1" strike="noStrike">
+              <a:rPr b="0" lang="ru-RU" sz="1600" spc="-1" strike="noStrike">
                 <a:solidFill>
                   <a:srgbClr val="000000"/>
                 </a:solidFill>
@@ -20235,7 +20345,7 @@
               </a:rPr>
               <a:t> {</a:t>
             </a:r>
-            <a:endParaRPr b="0" lang="ru-RU" sz="1400" spc="-1" strike="noStrike">
+            <a:endParaRPr b="0" lang="ru-RU" sz="1600" spc="-1" strike="noStrike">
               <a:latin typeface="Arial"/>
             </a:endParaRPr>
           </a:p>
@@ -20246,7 +20356,7 @@
               </a:lnSpc>
             </a:pPr>
             <a:r>
-              <a:rPr b="0" lang="ru-RU" sz="1400" spc="-1" strike="noStrike">
+              <a:rPr b="0" lang="ru-RU" sz="1600" spc="-1" strike="noStrike">
                 <a:solidFill>
                   <a:srgbClr val="000000"/>
                 </a:solidFill>
@@ -20256,7 +20366,7 @@
               <a:t>        </a:t>
             </a:r>
             <a:r>
-              <a:rPr b="0" lang="ru-RU" sz="1400" spc="-1" strike="noStrike">
+              <a:rPr b="0" lang="ru-RU" sz="1600" spc="-1" strike="noStrike">
                 <a:solidFill>
                   <a:srgbClr val="000000"/>
                 </a:solidFill>
@@ -20266,7 +20376,7 @@
               <a:t>chunks.push_back(std</a:t>
             </a:r>
             <a:r>
-              <a:rPr b="0" lang="ru-RU" sz="1400" spc="-1" strike="noStrike">
+              <a:rPr b="0" lang="ru-RU" sz="1600" spc="-1" strike="noStrike">
                 <a:solidFill>
                   <a:srgbClr val="666666"/>
                 </a:solidFill>
@@ -20276,7 +20386,7 @@
               <a:t>::</a:t>
             </a:r>
             <a:r>
-              <a:rPr b="0" lang="ru-RU" sz="1400" spc="-1" strike="noStrike">
+              <a:rPr b="0" lang="ru-RU" sz="1600" spc="-1" strike="noStrike">
                 <a:solidFill>
                   <a:srgbClr val="000000"/>
                 </a:solidFill>
@@ -20285,7 +20395,7 @@
               </a:rPr>
               <a:t>move(new_chunk));</a:t>
             </a:r>
-            <a:endParaRPr b="0" lang="ru-RU" sz="1400" spc="-1" strike="noStrike">
+            <a:endParaRPr b="0" lang="ru-RU" sz="1600" spc="-1" strike="noStrike">
               <a:latin typeface="Arial"/>
             </a:endParaRPr>
           </a:p>
@@ -20296,7 +20406,7 @@
               </a:lnSpc>
             </a:pPr>
             <a:r>
-              <a:rPr b="0" lang="ru-RU" sz="1400" spc="-1" strike="noStrike">
+              <a:rPr b="0" lang="ru-RU" sz="1600" spc="-1" strike="noStrike">
                 <a:solidFill>
                   <a:srgbClr val="000000"/>
                 </a:solidFill>
@@ -20306,7 +20416,7 @@
               <a:t>    </a:t>
             </a:r>
             <a:r>
-              <a:rPr b="0" lang="ru-RU" sz="1400" spc="-1" strike="noStrike">
+              <a:rPr b="0" lang="ru-RU" sz="1600" spc="-1" strike="noStrike">
                 <a:solidFill>
                   <a:srgbClr val="000000"/>
                 </a:solidFill>
@@ -20315,7 +20425,7 @@
               </a:rPr>
               <a:t>}</a:t>
             </a:r>
-            <a:endParaRPr b="0" lang="ru-RU" sz="1400" spc="-1" strike="noStrike">
+            <a:endParaRPr b="0" lang="ru-RU" sz="1600" spc="-1" strike="noStrike">
               <a:latin typeface="Arial"/>
             </a:endParaRPr>
           </a:p>
@@ -20326,7 +20436,7 @@
               </a:lnSpc>
             </a:pPr>
             <a:r>
-              <a:rPr b="0" lang="ru-RU" sz="1400" spc="-1" strike="noStrike">
+              <a:rPr b="0" lang="ru-RU" sz="1600" spc="-1" strike="noStrike">
                 <a:solidFill>
                   <a:srgbClr val="000000"/>
                 </a:solidFill>
@@ -20335,7 +20445,7 @@
               </a:rPr>
               <a:t>}</a:t>
             </a:r>
-            <a:endParaRPr b="0" lang="ru-RU" sz="1400" spc="-1" strike="noStrike">
+            <a:endParaRPr b="0" lang="ru-RU" sz="1600" spc="-1" strike="noStrike">
               <a:latin typeface="Arial"/>
             </a:endParaRPr>
           </a:p>
@@ -20345,7 +20455,7 @@
                 <a:spcPct val="100000"/>
               </a:lnSpc>
             </a:pPr>
-            <a:endParaRPr b="0" lang="ru-RU" sz="1400" spc="-1" strike="noStrike">
+            <a:endParaRPr b="0" lang="ru-RU" sz="1600" spc="-1" strike="noStrike">
               <a:latin typeface="Arial"/>
             </a:endParaRPr>
           </a:p>
@@ -20355,7 +20465,7 @@
                 <a:spcPct val="100000"/>
               </a:lnSpc>
             </a:pPr>
-            <a:endParaRPr b="0" lang="ru-RU" sz="1400" spc="-1" strike="noStrike">
+            <a:endParaRPr b="0" lang="ru-RU" sz="1600" spc="-1" strike="noStrike">
               <a:latin typeface="Arial"/>
             </a:endParaRPr>
           </a:p>
@@ -20365,7 +20475,7 @@
                 <a:spcPct val="100000"/>
               </a:lnSpc>
             </a:pPr>
-            <a:endParaRPr b="0" lang="ru-RU" sz="1400" spc="-1" strike="noStrike">
+            <a:endParaRPr b="0" lang="ru-RU" sz="1600" spc="-1" strike="noStrike">
               <a:latin typeface="Arial"/>
             </a:endParaRPr>
           </a:p>
@@ -20375,7 +20485,7 @@
                 <a:spcPct val="100000"/>
               </a:lnSpc>
             </a:pPr>
-            <a:endParaRPr b="0" lang="ru-RU" sz="1400" spc="-1" strike="noStrike">
+            <a:endParaRPr b="0" lang="ru-RU" sz="1600" spc="-1" strike="noStrike">
               <a:latin typeface="Arial"/>
             </a:endParaRPr>
           </a:p>
@@ -20424,7 +20534,7 @@
         <p:spPr>
           <a:xfrm>
             <a:off x="0" y="14040"/>
-            <a:ext cx="8999280" cy="714600"/>
+            <a:ext cx="8998920" cy="714240"/>
           </a:xfrm>
           <a:prstGeom prst="rect">
             <a:avLst/>
@@ -20475,7 +20585,7 @@
         <p:spPr>
           <a:xfrm>
             <a:off x="0" y="1080000"/>
-            <a:ext cx="4283640" cy="1079640"/>
+            <a:ext cx="4283280" cy="1079280"/>
           </a:xfrm>
           <a:prstGeom prst="rect">
             <a:avLst/>
@@ -20810,7 +20920,7 @@
         <p:spPr>
           <a:xfrm>
             <a:off x="4320000" y="1045440"/>
-            <a:ext cx="4913640" cy="1625760"/>
+            <a:ext cx="4913280" cy="1625400"/>
           </a:xfrm>
           <a:prstGeom prst="rect">
             <a:avLst/>
@@ -20842,6 +20952,7 @@
                   <a:srgbClr val="000000"/>
                 </a:solidFill>
                 <a:latin typeface="Arial"/>
+                <a:ea typeface="DejaVu Sans"/>
               </a:rPr>
               <a:t>  </a:t>
             </a:r>
@@ -20851,6 +20962,7 @@
                   <a:srgbClr val="008000"/>
                 </a:solidFill>
                 <a:latin typeface="Arial"/>
+                <a:ea typeface="DejaVu Sans"/>
               </a:rPr>
               <a:t>auto</a:t>
             </a:r>
@@ -20860,6 +20972,7 @@
                   <a:srgbClr val="000000"/>
                 </a:solidFill>
                 <a:latin typeface="Arial"/>
+                <a:ea typeface="DejaVu Sans"/>
               </a:rPr>
               <a:t> get_idx(std</a:t>
             </a:r>
@@ -20869,6 +20982,7 @@
                   <a:srgbClr val="666666"/>
                 </a:solidFill>
                 <a:latin typeface="Arial"/>
+                <a:ea typeface="DejaVu Sans"/>
               </a:rPr>
               <a:t>::</a:t>
             </a:r>
@@ -20878,6 +20992,7 @@
                   <a:srgbClr val="b00040"/>
                 </a:solidFill>
                 <a:latin typeface="Arial"/>
+                <a:ea typeface="DejaVu Sans"/>
               </a:rPr>
               <a:t>size_t</a:t>
             </a:r>
@@ -20887,6 +21002,7 @@
                   <a:srgbClr val="000000"/>
                 </a:solidFill>
                 <a:latin typeface="Arial"/>
+                <a:ea typeface="DejaVu Sans"/>
               </a:rPr>
               <a:t> idx, </a:t>
             </a:r>
@@ -20896,6 +21012,7 @@
                   <a:srgbClr val="b00040"/>
                 </a:solidFill>
                 <a:latin typeface="Arial"/>
+                <a:ea typeface="DejaVu Sans"/>
               </a:rPr>
               <a:t>bool</a:t>
             </a:r>
@@ -20905,6 +21022,7 @@
                   <a:srgbClr val="000000"/>
                 </a:solidFill>
                 <a:latin typeface="Arial"/>
+                <a:ea typeface="DejaVu Sans"/>
               </a:rPr>
               <a:t> reverse) </a:t>
             </a:r>
@@ -20914,6 +21032,7 @@
                   <a:srgbClr val="008000"/>
                 </a:solidFill>
                 <a:latin typeface="Arial"/>
+                <a:ea typeface="DejaVu Sans"/>
               </a:rPr>
               <a:t>const</a:t>
             </a:r>
@@ -20923,6 +21042,7 @@
                   <a:srgbClr val="000000"/>
                 </a:solidFill>
                 <a:latin typeface="Arial"/>
+                <a:ea typeface="DejaVu Sans"/>
               </a:rPr>
               <a:t> </a:t>
             </a:r>
@@ -20932,6 +21052,7 @@
                   <a:srgbClr val="666666"/>
                 </a:solidFill>
                 <a:latin typeface="Arial"/>
+                <a:ea typeface="DejaVu Sans"/>
               </a:rPr>
               <a:t>-&gt;</a:t>
             </a:r>
@@ -20941,6 +21062,7 @@
                   <a:srgbClr val="000000"/>
                 </a:solidFill>
                 <a:latin typeface="Arial"/>
+                <a:ea typeface="DejaVu Sans"/>
               </a:rPr>
               <a:t> std</a:t>
             </a:r>
@@ -20950,6 +21072,7 @@
                   <a:srgbClr val="666666"/>
                 </a:solidFill>
                 <a:latin typeface="Arial"/>
+                <a:ea typeface="DejaVu Sans"/>
               </a:rPr>
               <a:t>::</a:t>
             </a:r>
@@ -20959,6 +21082,7 @@
                   <a:srgbClr val="b00040"/>
                 </a:solidFill>
                 <a:latin typeface="Arial"/>
+                <a:ea typeface="DejaVu Sans"/>
               </a:rPr>
               <a:t>size_t</a:t>
             </a:r>
@@ -20968,6 +21092,7 @@
                   <a:srgbClr val="000000"/>
                 </a:solidFill>
                 <a:latin typeface="Arial"/>
+                <a:ea typeface="DejaVu Sans"/>
               </a:rPr>
               <a:t> {</a:t>
             </a:r>
@@ -20987,6 +21112,7 @@
                   <a:srgbClr val="000000"/>
                 </a:solidFill>
                 <a:latin typeface="Arial"/>
+                <a:ea typeface="DejaVu Sans"/>
               </a:rPr>
               <a:t>    </a:t>
             </a:r>
@@ -20996,6 +21122,7 @@
                   <a:srgbClr val="000000"/>
                 </a:solidFill>
                 <a:latin typeface="Arial"/>
+                <a:ea typeface="DejaVu Sans"/>
               </a:rPr>
               <a:t>idx </a:t>
             </a:r>
@@ -21005,6 +21132,7 @@
                   <a:srgbClr val="666666"/>
                 </a:solidFill>
                 <a:latin typeface="Arial"/>
+                <a:ea typeface="DejaVu Sans"/>
               </a:rPr>
               <a:t>=</a:t>
             </a:r>
@@ -21014,6 +21142,7 @@
                   <a:srgbClr val="000000"/>
                 </a:solidFill>
                 <a:latin typeface="Arial"/>
+                <a:ea typeface="DejaVu Sans"/>
               </a:rPr>
               <a:t> (left_idx </a:t>
             </a:r>
@@ -21023,6 +21152,7 @@
                   <a:srgbClr val="666666"/>
                 </a:solidFill>
                 <a:latin typeface="Arial"/>
+                <a:ea typeface="DejaVu Sans"/>
               </a:rPr>
               <a:t>+</a:t>
             </a:r>
@@ -21032,6 +21162,7 @@
                   <a:srgbClr val="000000"/>
                 </a:solidFill>
                 <a:latin typeface="Arial"/>
+                <a:ea typeface="DejaVu Sans"/>
               </a:rPr>
               <a:t> idx) </a:t>
             </a:r>
@@ -21041,6 +21172,7 @@
                   <a:srgbClr val="666666"/>
                 </a:solidFill>
                 <a:latin typeface="Arial"/>
+                <a:ea typeface="DejaVu Sans"/>
               </a:rPr>
               <a:t>%</a:t>
             </a:r>
@@ -21050,6 +21182,7 @@
                   <a:srgbClr val="000000"/>
                 </a:solidFill>
                 <a:latin typeface="Arial"/>
+                <a:ea typeface="DejaVu Sans"/>
               </a:rPr>
               <a:t> CHUNK_SIZE;</a:t>
             </a:r>
@@ -21069,6 +21202,7 @@
                   <a:srgbClr val="000000"/>
                 </a:solidFill>
                 <a:latin typeface="Arial"/>
+                <a:ea typeface="DejaVu Sans"/>
               </a:rPr>
               <a:t>    </a:t>
             </a:r>
@@ -21078,6 +21212,7 @@
                   <a:srgbClr val="008000"/>
                 </a:solidFill>
                 <a:latin typeface="Arial"/>
+                <a:ea typeface="DejaVu Sans"/>
               </a:rPr>
               <a:t>return</a:t>
             </a:r>
@@ -21087,6 +21222,7 @@
                   <a:srgbClr val="000000"/>
                 </a:solidFill>
                 <a:latin typeface="Arial"/>
+                <a:ea typeface="DejaVu Sans"/>
               </a:rPr>
               <a:t> (reverse </a:t>
             </a:r>
@@ -21096,6 +21232,7 @@
                   <a:srgbClr val="666666"/>
                 </a:solidFill>
                 <a:latin typeface="Arial"/>
+                <a:ea typeface="DejaVu Sans"/>
               </a:rPr>
               <a:t>?</a:t>
             </a:r>
@@ -21105,6 +21242,7 @@
                   <a:srgbClr val="000000"/>
                 </a:solidFill>
                 <a:latin typeface="Arial"/>
+                <a:ea typeface="DejaVu Sans"/>
               </a:rPr>
               <a:t> CHUNK_SIZE </a:t>
             </a:r>
@@ -21114,6 +21252,7 @@
                   <a:srgbClr val="666666"/>
                 </a:solidFill>
                 <a:latin typeface="Arial"/>
+                <a:ea typeface="DejaVu Sans"/>
               </a:rPr>
               <a:t>-</a:t>
             </a:r>
@@ -21123,6 +21262,7 @@
                   <a:srgbClr val="000000"/>
                 </a:solidFill>
                 <a:latin typeface="Arial"/>
+                <a:ea typeface="DejaVu Sans"/>
               </a:rPr>
               <a:t> idx </a:t>
             </a:r>
@@ -21132,6 +21272,7 @@
                   <a:srgbClr val="666666"/>
                 </a:solidFill>
                 <a:latin typeface="Arial"/>
+                <a:ea typeface="DejaVu Sans"/>
               </a:rPr>
               <a:t>-</a:t>
             </a:r>
@@ -21141,6 +21282,7 @@
                   <a:srgbClr val="000000"/>
                 </a:solidFill>
                 <a:latin typeface="Arial"/>
+                <a:ea typeface="DejaVu Sans"/>
               </a:rPr>
               <a:t> </a:t>
             </a:r>
@@ -21150,6 +21292,7 @@
                   <a:srgbClr val="666666"/>
                 </a:solidFill>
                 <a:latin typeface="Arial"/>
+                <a:ea typeface="DejaVu Sans"/>
               </a:rPr>
               <a:t>1</a:t>
             </a:r>
@@ -21159,6 +21302,7 @@
                   <a:srgbClr val="000000"/>
                 </a:solidFill>
                 <a:latin typeface="Arial"/>
+                <a:ea typeface="DejaVu Sans"/>
               </a:rPr>
               <a:t> </a:t>
             </a:r>
@@ -21168,6 +21312,7 @@
                   <a:srgbClr val="666666"/>
                 </a:solidFill>
                 <a:latin typeface="Arial"/>
+                <a:ea typeface="DejaVu Sans"/>
               </a:rPr>
               <a:t>:</a:t>
             </a:r>
@@ -21177,6 +21322,7 @@
                   <a:srgbClr val="000000"/>
                 </a:solidFill>
                 <a:latin typeface="Arial"/>
+                <a:ea typeface="DejaVu Sans"/>
               </a:rPr>
               <a:t> idx);</a:t>
             </a:r>
@@ -21196,6 +21342,7 @@
                   <a:srgbClr val="000000"/>
                 </a:solidFill>
                 <a:latin typeface="Arial"/>
+                <a:ea typeface="DejaVu Sans"/>
               </a:rPr>
               <a:t>}</a:t>
             </a:r>
@@ -21241,7 +21388,7 @@
         <p:spPr>
           <a:xfrm>
             <a:off x="4320000" y="2769840"/>
-            <a:ext cx="4823640" cy="1369800"/>
+            <a:ext cx="4823280" cy="1369440"/>
           </a:xfrm>
           <a:prstGeom prst="rect">
             <a:avLst/>
@@ -21273,6 +21420,7 @@
                   <a:srgbClr val="008000"/>
                 </a:solidFill>
                 <a:latin typeface="Arial"/>
+                <a:ea typeface="DejaVu Sans"/>
               </a:rPr>
               <a:t>auto</a:t>
             </a:r>
@@ -21282,6 +21430,7 @@
                   <a:srgbClr val="000000"/>
                 </a:solidFill>
                 <a:latin typeface="Arial"/>
+                <a:ea typeface="DejaVu Sans"/>
               </a:rPr>
               <a:t> get_idx(std</a:t>
             </a:r>
@@ -21291,6 +21440,7 @@
                   <a:srgbClr val="666666"/>
                 </a:solidFill>
                 <a:latin typeface="Arial"/>
+                <a:ea typeface="DejaVu Sans"/>
               </a:rPr>
               <a:t>::</a:t>
             </a:r>
@@ -21300,6 +21450,7 @@
                   <a:srgbClr val="b00040"/>
                 </a:solidFill>
                 <a:latin typeface="Arial"/>
+                <a:ea typeface="DejaVu Sans"/>
               </a:rPr>
               <a:t>size_t</a:t>
             </a:r>
@@ -21309,6 +21460,7 @@
                   <a:srgbClr val="000000"/>
                 </a:solidFill>
                 <a:latin typeface="Arial"/>
+                <a:ea typeface="DejaVu Sans"/>
               </a:rPr>
               <a:t> idx) </a:t>
             </a:r>
@@ -21318,6 +21470,7 @@
                   <a:srgbClr val="666666"/>
                 </a:solidFill>
                 <a:latin typeface="Arial"/>
+                <a:ea typeface="DejaVu Sans"/>
               </a:rPr>
               <a:t>-&gt;</a:t>
             </a:r>
@@ -21327,6 +21480,7 @@
                   <a:srgbClr val="000000"/>
                 </a:solidFill>
                 <a:latin typeface="Arial"/>
+                <a:ea typeface="DejaVu Sans"/>
               </a:rPr>
               <a:t> std</a:t>
             </a:r>
@@ -21336,6 +21490,7 @@
                   <a:srgbClr val="666666"/>
                 </a:solidFill>
                 <a:latin typeface="Arial"/>
+                <a:ea typeface="DejaVu Sans"/>
               </a:rPr>
               <a:t>::</a:t>
             </a:r>
@@ -21345,6 +21500,7 @@
                   <a:srgbClr val="b00040"/>
                 </a:solidFill>
                 <a:latin typeface="Arial"/>
+                <a:ea typeface="DejaVu Sans"/>
               </a:rPr>
               <a:t>size_t</a:t>
             </a:r>
@@ -21354,6 +21510,7 @@
                   <a:srgbClr val="000000"/>
                 </a:solidFill>
                 <a:latin typeface="Arial"/>
+                <a:ea typeface="DejaVu Sans"/>
               </a:rPr>
               <a:t> {</a:t>
             </a:r>
@@ -21373,6 +21530,7 @@
                   <a:srgbClr val="000000"/>
                 </a:solidFill>
                 <a:latin typeface="Arial"/>
+                <a:ea typeface="DejaVu Sans"/>
               </a:rPr>
               <a:t>    </a:t>
             </a:r>
@@ -21382,6 +21540,7 @@
                   <a:srgbClr val="008000"/>
                 </a:solidFill>
                 <a:latin typeface="Arial"/>
+                <a:ea typeface="DejaVu Sans"/>
               </a:rPr>
               <a:t>return</a:t>
             </a:r>
@@ -21391,6 +21550,7 @@
                   <a:srgbClr val="000000"/>
                 </a:solidFill>
                 <a:latin typeface="Arial"/>
+                <a:ea typeface="DejaVu Sans"/>
               </a:rPr>
               <a:t> get_idx(idx, get_chunk(idx) </a:t>
             </a:r>
@@ -21400,6 +21560,7 @@
                   <a:srgbClr val="666666"/>
                 </a:solidFill>
                 <a:latin typeface="Arial"/>
+                <a:ea typeface="DejaVu Sans"/>
               </a:rPr>
               <a:t>&lt;</a:t>
             </a:r>
@@ -21409,6 +21570,7 @@
                   <a:srgbClr val="000000"/>
                 </a:solidFill>
                 <a:latin typeface="Arial"/>
+                <a:ea typeface="DejaVu Sans"/>
               </a:rPr>
               <a:t> start_chunk);</a:t>
             </a:r>
@@ -21428,6 +21590,7 @@
                   <a:srgbClr val="000000"/>
                 </a:solidFill>
                 <a:latin typeface="Arial"/>
+                <a:ea typeface="DejaVu Sans"/>
               </a:rPr>
               <a:t>}</a:t>
             </a:r>
@@ -21455,7 +21618,7 @@
         </p:nvSpPr>
         <p:spPr>
           <a:xfrm>
-            <a:off x="4284000" y="3960000"/>
+            <a:off x="4284000" y="4017960"/>
             <a:ext cx="4860000" cy="360"/>
           </a:xfrm>
           <a:prstGeom prst="line">
@@ -21483,7 +21646,7 @@
         <p:spPr>
           <a:xfrm>
             <a:off x="0" y="2353680"/>
-            <a:ext cx="4139640" cy="345960"/>
+            <a:ext cx="4139280" cy="345600"/>
           </a:xfrm>
           <a:prstGeom prst="rect">
             <a:avLst/>
@@ -21515,6 +21678,7 @@
                   <a:srgbClr val="000000"/>
                 </a:solidFill>
                 <a:latin typeface="Arial"/>
+                <a:ea typeface="DejaVu Sans"/>
               </a:rPr>
               <a:t>deque</a:t>
             </a:r>
@@ -21524,6 +21688,7 @@
                   <a:srgbClr val="666666"/>
                 </a:solidFill>
                 <a:latin typeface="Arial"/>
+                <a:ea typeface="DejaVu Sans"/>
               </a:rPr>
               <a:t>&lt;</a:t>
             </a:r>
@@ -21533,6 +21698,7 @@
                   <a:srgbClr val="b00040"/>
                 </a:solidFill>
                 <a:latin typeface="Arial"/>
+                <a:ea typeface="DejaVu Sans"/>
               </a:rPr>
               <a:t>int</a:t>
             </a:r>
@@ -21542,6 +21708,7 @@
                   <a:srgbClr val="666666"/>
                 </a:solidFill>
                 <a:latin typeface="Arial"/>
+                <a:ea typeface="DejaVu Sans"/>
               </a:rPr>
               <a:t>&gt;</a:t>
             </a:r>
@@ -21551,6 +21718,7 @@
                   <a:srgbClr val="000000"/>
                 </a:solidFill>
                 <a:latin typeface="Arial"/>
+                <a:ea typeface="DejaVu Sans"/>
               </a:rPr>
               <a:t> myDeque{</a:t>
             </a:r>
@@ -21560,6 +21728,7 @@
                   <a:srgbClr val="666666"/>
                 </a:solidFill>
                 <a:latin typeface="Arial"/>
+                <a:ea typeface="DejaVu Sans"/>
               </a:rPr>
               <a:t>1</a:t>
             </a:r>
@@ -21569,6 +21738,7 @@
                   <a:srgbClr val="000000"/>
                 </a:solidFill>
                 <a:latin typeface="Arial"/>
+                <a:ea typeface="DejaVu Sans"/>
               </a:rPr>
               <a:t>, </a:t>
             </a:r>
@@ -21578,6 +21748,7 @@
                   <a:srgbClr val="666666"/>
                 </a:solidFill>
                 <a:latin typeface="Arial"/>
+                <a:ea typeface="DejaVu Sans"/>
               </a:rPr>
               <a:t>2</a:t>
             </a:r>
@@ -21587,6 +21758,7 @@
                   <a:srgbClr val="000000"/>
                 </a:solidFill>
                 <a:latin typeface="Arial"/>
+                <a:ea typeface="DejaVu Sans"/>
               </a:rPr>
               <a:t>, </a:t>
             </a:r>
@@ -21596,6 +21768,7 @@
                   <a:srgbClr val="666666"/>
                 </a:solidFill>
                 <a:latin typeface="Arial"/>
+                <a:ea typeface="DejaVu Sans"/>
               </a:rPr>
               <a:t>3</a:t>
             </a:r>
@@ -21605,6 +21778,7 @@
                   <a:srgbClr val="000000"/>
                 </a:solidFill>
                 <a:latin typeface="Arial"/>
+                <a:ea typeface="DejaVu Sans"/>
               </a:rPr>
               <a:t>, </a:t>
             </a:r>
@@ -21614,6 +21788,7 @@
                   <a:srgbClr val="666666"/>
                 </a:solidFill>
                 <a:latin typeface="Arial"/>
+                <a:ea typeface="DejaVu Sans"/>
               </a:rPr>
               <a:t>4</a:t>
             </a:r>
@@ -21623,6 +21798,7 @@
                   <a:srgbClr val="000000"/>
                 </a:solidFill>
                 <a:latin typeface="Arial"/>
+                <a:ea typeface="DejaVu Sans"/>
               </a:rPr>
               <a:t>, </a:t>
             </a:r>
@@ -21632,6 +21808,7 @@
                   <a:srgbClr val="666666"/>
                 </a:solidFill>
                 <a:latin typeface="Arial"/>
+                <a:ea typeface="DejaVu Sans"/>
               </a:rPr>
               <a:t>5</a:t>
             </a:r>
@@ -21641,6 +21818,7 @@
                   <a:srgbClr val="000000"/>
                 </a:solidFill>
                 <a:latin typeface="Arial"/>
+                <a:ea typeface="DejaVu Sans"/>
               </a:rPr>
               <a:t>};</a:t>
             </a:r>
@@ -21659,7 +21837,7 @@
         <p:spPr>
           <a:xfrm>
             <a:off x="0" y="3420000"/>
-            <a:ext cx="4139640" cy="601920"/>
+            <a:ext cx="4139280" cy="601560"/>
           </a:xfrm>
           <a:prstGeom prst="rect">
             <a:avLst/>
@@ -21691,6 +21869,7 @@
                   <a:srgbClr val="047642"/>
                 </a:solidFill>
                 <a:latin typeface="Arial"/>
+                <a:ea typeface="DejaVu Sans"/>
               </a:rPr>
               <a:t>// chunks = {{0, -1}, {1, 2, 3, 4, 5}}, left_idx = 6, start_chunk = 1</a:t>
             </a:r>
@@ -21709,7 +21888,7 @@
         <p:spPr>
           <a:xfrm>
             <a:off x="0" y="2713680"/>
-            <a:ext cx="3419640" cy="345960"/>
+            <a:ext cx="3419280" cy="345600"/>
           </a:xfrm>
           <a:prstGeom prst="rect">
             <a:avLst/>
@@ -21741,6 +21920,7 @@
                   <a:srgbClr val="000000"/>
                 </a:solidFill>
                 <a:latin typeface="Arial"/>
+                <a:ea typeface="DejaVu Sans"/>
               </a:rPr>
               <a:t>myDeque.push_front(</a:t>
             </a:r>
@@ -21750,6 +21930,7 @@
                   <a:srgbClr val="666666"/>
                 </a:solidFill>
                 <a:latin typeface="Arial"/>
+                <a:ea typeface="DejaVu Sans"/>
               </a:rPr>
               <a:t>0</a:t>
             </a:r>
@@ -21759,6 +21940,7 @@
                   <a:srgbClr val="000000"/>
                 </a:solidFill>
                 <a:latin typeface="Arial"/>
+                <a:ea typeface="DejaVu Sans"/>
               </a:rPr>
               <a:t>);</a:t>
             </a:r>
@@ -21776,7 +21958,7 @@
         </p:nvSpPr>
         <p:spPr>
           <a:xfrm>
-            <a:off x="0" y="3960000"/>
+            <a:off x="0" y="4017600"/>
             <a:ext cx="4284000" cy="360"/>
           </a:xfrm>
           <a:prstGeom prst="line">
@@ -21804,7 +21986,7 @@
         <p:spPr>
           <a:xfrm>
             <a:off x="0" y="3060000"/>
-            <a:ext cx="3419640" cy="345960"/>
+            <a:ext cx="3419280" cy="345600"/>
           </a:xfrm>
           <a:prstGeom prst="rect">
             <a:avLst/>
@@ -21836,6 +22018,7 @@
                   <a:srgbClr val="000000"/>
                 </a:solidFill>
                 <a:latin typeface="Arial"/>
+                <a:ea typeface="DejaVu Sans"/>
               </a:rPr>
               <a:t>myDeque.push_front(</a:t>
             </a:r>
@@ -21845,6 +22028,7 @@
                   <a:srgbClr val="666666"/>
                 </a:solidFill>
                 <a:latin typeface="Arial"/>
+                <a:ea typeface="DejaVu Sans"/>
               </a:rPr>
               <a:t>-1</a:t>
             </a:r>
@@ -21854,6 +22038,7 @@
                   <a:srgbClr val="000000"/>
                 </a:solidFill>
                 <a:latin typeface="Arial"/>
+                <a:ea typeface="DejaVu Sans"/>
               </a:rPr>
               <a:t>);</a:t>
             </a:r>
@@ -21872,7 +22057,7 @@
         <p:spPr>
           <a:xfrm>
             <a:off x="0" y="4022280"/>
-            <a:ext cx="1259640" cy="301680"/>
+            <a:ext cx="1259280" cy="301320"/>
           </a:xfrm>
           <a:prstGeom prst="rect">
             <a:avLst/>
@@ -21904,6 +22089,7 @@
                   <a:srgbClr val="000000"/>
                 </a:solidFill>
                 <a:latin typeface="Arial"/>
+                <a:ea typeface="DejaVu Sans"/>
               </a:rPr>
               <a:t>myDeque[</a:t>
             </a:r>
@@ -21913,6 +22099,7 @@
                   <a:srgbClr val="666666"/>
                 </a:solidFill>
                 <a:latin typeface="Arial"/>
+                <a:ea typeface="DejaVu Sans"/>
               </a:rPr>
               <a:t>0</a:t>
             </a:r>
@@ -21922,6 +22109,7 @@
                   <a:srgbClr val="000000"/>
                 </a:solidFill>
                 <a:latin typeface="Arial"/>
+                <a:ea typeface="DejaVu Sans"/>
               </a:rPr>
               <a:t>]</a:t>
             </a:r>
@@ -21940,7 +22128,7 @@
         <p:spPr>
           <a:xfrm>
             <a:off x="0" y="4324320"/>
-            <a:ext cx="3779640" cy="355320"/>
+            <a:ext cx="3779280" cy="354960"/>
           </a:xfrm>
           <a:prstGeom prst="rect">
             <a:avLst/>
@@ -21972,6 +22160,7 @@
                   <a:srgbClr val="000000"/>
                 </a:solidFill>
                 <a:latin typeface="Arial"/>
+                <a:ea typeface="DejaVu Sans"/>
               </a:rPr>
               <a:t>chunk_idx </a:t>
             </a:r>
@@ -21981,6 +22170,7 @@
                   <a:srgbClr val="666666"/>
                 </a:solidFill>
                 <a:latin typeface="Arial"/>
+                <a:ea typeface="DejaVu Sans"/>
               </a:rPr>
               <a:t>=</a:t>
             </a:r>
@@ -21990,6 +22180,7 @@
                   <a:srgbClr val="000000"/>
                 </a:solidFill>
                 <a:latin typeface="Arial"/>
+                <a:ea typeface="DejaVu Sans"/>
               </a:rPr>
               <a:t> (</a:t>
             </a:r>
@@ -21999,6 +22190,7 @@
                   <a:srgbClr val="666666"/>
                 </a:solidFill>
                 <a:latin typeface="Arial"/>
+                <a:ea typeface="DejaVu Sans"/>
               </a:rPr>
               <a:t>6</a:t>
             </a:r>
@@ -22008,6 +22200,7 @@
                   <a:srgbClr val="000000"/>
                 </a:solidFill>
                 <a:latin typeface="Arial"/>
+                <a:ea typeface="DejaVu Sans"/>
               </a:rPr>
               <a:t> </a:t>
             </a:r>
@@ -22017,6 +22210,7 @@
                   <a:srgbClr val="666666"/>
                 </a:solidFill>
                 <a:latin typeface="Arial"/>
+                <a:ea typeface="DejaVu Sans"/>
               </a:rPr>
               <a:t>+</a:t>
             </a:r>
@@ -22026,6 +22220,7 @@
                   <a:srgbClr val="000000"/>
                 </a:solidFill>
                 <a:latin typeface="Arial"/>
+                <a:ea typeface="DejaVu Sans"/>
               </a:rPr>
               <a:t> </a:t>
             </a:r>
@@ -22035,6 +22230,7 @@
                   <a:srgbClr val="666666"/>
                 </a:solidFill>
                 <a:latin typeface="Arial"/>
+                <a:ea typeface="DejaVu Sans"/>
               </a:rPr>
               <a:t>0</a:t>
             </a:r>
@@ -22044,6 +22240,7 @@
                   <a:srgbClr val="000000"/>
                 </a:solidFill>
                 <a:latin typeface="Arial"/>
+                <a:ea typeface="DejaVu Sans"/>
               </a:rPr>
               <a:t>) </a:t>
             </a:r>
@@ -22053,6 +22250,7 @@
                   <a:srgbClr val="666666"/>
                 </a:solidFill>
                 <a:latin typeface="Arial"/>
+                <a:ea typeface="DejaVu Sans"/>
               </a:rPr>
               <a:t>/</a:t>
             </a:r>
@@ -22062,6 +22260,7 @@
                   <a:srgbClr val="000000"/>
                 </a:solidFill>
                 <a:latin typeface="Arial"/>
+                <a:ea typeface="DejaVu Sans"/>
               </a:rPr>
               <a:t> </a:t>
             </a:r>
@@ -22071,6 +22270,7 @@
                   <a:srgbClr val="666666"/>
                 </a:solidFill>
                 <a:latin typeface="Arial"/>
+                <a:ea typeface="DejaVu Sans"/>
               </a:rPr>
               <a:t>8</a:t>
             </a:r>
@@ -22080,6 +22280,7 @@
                   <a:srgbClr val="000000"/>
                 </a:solidFill>
                 <a:latin typeface="Arial"/>
+                <a:ea typeface="DejaVu Sans"/>
               </a:rPr>
               <a:t> </a:t>
             </a:r>
@@ -22089,6 +22290,7 @@
                   <a:srgbClr val="666666"/>
                 </a:solidFill>
                 <a:latin typeface="Arial"/>
+                <a:ea typeface="DejaVu Sans"/>
               </a:rPr>
               <a:t>=</a:t>
             </a:r>
@@ -22098,6 +22300,7 @@
                   <a:srgbClr val="000000"/>
                 </a:solidFill>
                 <a:latin typeface="Arial"/>
+                <a:ea typeface="DejaVu Sans"/>
               </a:rPr>
               <a:t> </a:t>
             </a:r>
@@ -22107,6 +22310,7 @@
                   <a:srgbClr val="666666"/>
                 </a:solidFill>
                 <a:latin typeface="Arial"/>
+                <a:ea typeface="DejaVu Sans"/>
               </a:rPr>
               <a:t>6</a:t>
             </a:r>
@@ -22116,6 +22320,7 @@
                   <a:srgbClr val="000000"/>
                 </a:solidFill>
                 <a:latin typeface="Arial"/>
+                <a:ea typeface="DejaVu Sans"/>
               </a:rPr>
               <a:t> </a:t>
             </a:r>
@@ -22125,6 +22330,7 @@
                   <a:srgbClr val="666666"/>
                 </a:solidFill>
                 <a:latin typeface="Arial"/>
+                <a:ea typeface="DejaVu Sans"/>
               </a:rPr>
               <a:t>/</a:t>
             </a:r>
@@ -22134,6 +22340,7 @@
                   <a:srgbClr val="000000"/>
                 </a:solidFill>
                 <a:latin typeface="Arial"/>
+                <a:ea typeface="DejaVu Sans"/>
               </a:rPr>
               <a:t> </a:t>
             </a:r>
@@ -22143,6 +22350,7 @@
                   <a:srgbClr val="666666"/>
                 </a:solidFill>
                 <a:latin typeface="Arial"/>
+                <a:ea typeface="DejaVu Sans"/>
               </a:rPr>
               <a:t>8</a:t>
             </a:r>
@@ -22152,6 +22360,7 @@
                   <a:srgbClr val="000000"/>
                 </a:solidFill>
                 <a:latin typeface="Arial"/>
+                <a:ea typeface="DejaVu Sans"/>
               </a:rPr>
               <a:t> </a:t>
             </a:r>
@@ -22161,6 +22370,7 @@
                   <a:srgbClr val="666666"/>
                 </a:solidFill>
                 <a:latin typeface="Arial"/>
+                <a:ea typeface="DejaVu Sans"/>
               </a:rPr>
               <a:t>=</a:t>
             </a:r>
@@ -22170,6 +22380,7 @@
                   <a:srgbClr val="000000"/>
                 </a:solidFill>
                 <a:latin typeface="Arial"/>
+                <a:ea typeface="DejaVu Sans"/>
               </a:rPr>
               <a:t> </a:t>
             </a:r>
@@ -22179,6 +22390,7 @@
                   <a:srgbClr val="666666"/>
                 </a:solidFill>
                 <a:latin typeface="Arial"/>
+                <a:ea typeface="DejaVu Sans"/>
               </a:rPr>
               <a:t>0</a:t>
             </a:r>
@@ -22197,7 +22409,7 @@
         <p:spPr>
           <a:xfrm>
             <a:off x="0" y="4680000"/>
-            <a:ext cx="2339640" cy="355320"/>
+            <a:ext cx="2339280" cy="354960"/>
           </a:xfrm>
           <a:prstGeom prst="rect">
             <a:avLst/>
@@ -22229,6 +22441,7 @@
                   <a:srgbClr val="000000"/>
                 </a:solidFill>
                 <a:latin typeface="Arial"/>
+                <a:ea typeface="DejaVu Sans"/>
               </a:rPr>
               <a:t>idx </a:t>
             </a:r>
@@ -22238,6 +22451,7 @@
                   <a:srgbClr val="666666"/>
                 </a:solidFill>
                 <a:latin typeface="Arial"/>
+                <a:ea typeface="DejaVu Sans"/>
               </a:rPr>
               <a:t>=</a:t>
             </a:r>
@@ -22247,6 +22461,7 @@
                   <a:srgbClr val="000000"/>
                 </a:solidFill>
                 <a:latin typeface="Arial"/>
+                <a:ea typeface="DejaVu Sans"/>
               </a:rPr>
               <a:t> (</a:t>
             </a:r>
@@ -22256,6 +22471,7 @@
                   <a:srgbClr val="666666"/>
                 </a:solidFill>
                 <a:latin typeface="Arial"/>
+                <a:ea typeface="DejaVu Sans"/>
               </a:rPr>
               <a:t>6</a:t>
             </a:r>
@@ -22265,6 +22481,7 @@
                   <a:srgbClr val="000000"/>
                 </a:solidFill>
                 <a:latin typeface="Arial"/>
+                <a:ea typeface="DejaVu Sans"/>
               </a:rPr>
               <a:t> </a:t>
             </a:r>
@@ -22274,6 +22491,7 @@
                   <a:srgbClr val="666666"/>
                 </a:solidFill>
                 <a:latin typeface="Arial"/>
+                <a:ea typeface="DejaVu Sans"/>
               </a:rPr>
               <a:t>+</a:t>
             </a:r>
@@ -22283,6 +22501,7 @@
                   <a:srgbClr val="000000"/>
                 </a:solidFill>
                 <a:latin typeface="Arial"/>
+                <a:ea typeface="DejaVu Sans"/>
               </a:rPr>
               <a:t> </a:t>
             </a:r>
@@ -22292,6 +22511,7 @@
                   <a:srgbClr val="666666"/>
                 </a:solidFill>
                 <a:latin typeface="Arial"/>
+                <a:ea typeface="DejaVu Sans"/>
               </a:rPr>
               <a:t>0</a:t>
             </a:r>
@@ -22301,6 +22521,7 @@
                   <a:srgbClr val="000000"/>
                 </a:solidFill>
                 <a:latin typeface="Arial"/>
+                <a:ea typeface="DejaVu Sans"/>
               </a:rPr>
               <a:t>) </a:t>
             </a:r>
@@ -22310,6 +22531,7 @@
                   <a:srgbClr val="666666"/>
                 </a:solidFill>
                 <a:latin typeface="Arial"/>
+                <a:ea typeface="DejaVu Sans"/>
               </a:rPr>
               <a:t>%</a:t>
             </a:r>
@@ -22319,6 +22541,7 @@
                   <a:srgbClr val="000000"/>
                 </a:solidFill>
                 <a:latin typeface="Arial"/>
+                <a:ea typeface="DejaVu Sans"/>
               </a:rPr>
               <a:t> </a:t>
             </a:r>
@@ -22328,6 +22551,7 @@
                   <a:srgbClr val="666666"/>
                 </a:solidFill>
                 <a:latin typeface="Arial"/>
+                <a:ea typeface="DejaVu Sans"/>
               </a:rPr>
               <a:t>8</a:t>
             </a:r>
@@ -22337,6 +22561,7 @@
                   <a:srgbClr val="000000"/>
                 </a:solidFill>
                 <a:latin typeface="Arial"/>
+                <a:ea typeface="DejaVu Sans"/>
               </a:rPr>
               <a:t> </a:t>
             </a:r>
@@ -22346,6 +22571,7 @@
                   <a:srgbClr val="666666"/>
                 </a:solidFill>
                 <a:latin typeface="Arial"/>
+                <a:ea typeface="DejaVu Sans"/>
               </a:rPr>
               <a:t>=</a:t>
             </a:r>
@@ -22355,6 +22581,7 @@
                   <a:srgbClr val="000000"/>
                 </a:solidFill>
                 <a:latin typeface="Arial"/>
+                <a:ea typeface="DejaVu Sans"/>
               </a:rPr>
               <a:t> </a:t>
             </a:r>
@@ -22364,6 +22591,7 @@
                   <a:srgbClr val="666666"/>
                 </a:solidFill>
                 <a:latin typeface="Arial"/>
+                <a:ea typeface="DejaVu Sans"/>
               </a:rPr>
               <a:t>6</a:t>
             </a:r>
@@ -22373,6 +22601,7 @@
                   <a:srgbClr val="000000"/>
                 </a:solidFill>
                 <a:latin typeface="Arial"/>
+                <a:ea typeface="DejaVu Sans"/>
               </a:rPr>
               <a:t>;</a:t>
             </a:r>
@@ -22391,7 +22620,7 @@
         <p:spPr>
           <a:xfrm>
             <a:off x="1980000" y="4680000"/>
-            <a:ext cx="2339640" cy="355320"/>
+            <a:ext cx="2339280" cy="354960"/>
           </a:xfrm>
           <a:prstGeom prst="rect">
             <a:avLst/>
@@ -22423,6 +22652,7 @@
                   <a:srgbClr val="000000"/>
                 </a:solidFill>
                 <a:latin typeface="Arial"/>
+                <a:ea typeface="DejaVu Sans"/>
               </a:rPr>
               <a:t>idx </a:t>
             </a:r>
@@ -22432,6 +22662,7 @@
                   <a:srgbClr val="666666"/>
                 </a:solidFill>
                 <a:latin typeface="Arial"/>
+                <a:ea typeface="DejaVu Sans"/>
               </a:rPr>
               <a:t>=</a:t>
             </a:r>
@@ -22441,6 +22672,7 @@
                   <a:srgbClr val="000000"/>
                 </a:solidFill>
                 <a:latin typeface="Arial"/>
+                <a:ea typeface="DejaVu Sans"/>
               </a:rPr>
               <a:t> </a:t>
             </a:r>
@@ -22450,6 +22682,7 @@
                   <a:srgbClr val="666666"/>
                 </a:solidFill>
                 <a:latin typeface="Arial"/>
+                <a:ea typeface="DejaVu Sans"/>
               </a:rPr>
               <a:t>8</a:t>
             </a:r>
@@ -22459,6 +22692,7 @@
                   <a:srgbClr val="000000"/>
                 </a:solidFill>
                 <a:latin typeface="Arial"/>
+                <a:ea typeface="DejaVu Sans"/>
               </a:rPr>
               <a:t> </a:t>
             </a:r>
@@ -22468,6 +22702,7 @@
                   <a:srgbClr val="666666"/>
                 </a:solidFill>
                 <a:latin typeface="Arial"/>
+                <a:ea typeface="DejaVu Sans"/>
               </a:rPr>
               <a:t>-</a:t>
             </a:r>
@@ -22477,6 +22712,7 @@
                   <a:srgbClr val="000000"/>
                 </a:solidFill>
                 <a:latin typeface="Arial"/>
+                <a:ea typeface="DejaVu Sans"/>
               </a:rPr>
               <a:t> </a:t>
             </a:r>
@@ -22486,6 +22722,7 @@
                   <a:srgbClr val="666666"/>
                 </a:solidFill>
                 <a:latin typeface="Arial"/>
+                <a:ea typeface="DejaVu Sans"/>
               </a:rPr>
               <a:t>6</a:t>
             </a:r>
@@ -22495,6 +22732,7 @@
                   <a:srgbClr val="000000"/>
                 </a:solidFill>
                 <a:latin typeface="Arial"/>
+                <a:ea typeface="DejaVu Sans"/>
               </a:rPr>
               <a:t> </a:t>
             </a:r>
@@ -22504,6 +22742,7 @@
                   <a:srgbClr val="666666"/>
                 </a:solidFill>
                 <a:latin typeface="Arial"/>
+                <a:ea typeface="DejaVu Sans"/>
               </a:rPr>
               <a:t>-</a:t>
             </a:r>
@@ -22513,6 +22752,7 @@
                   <a:srgbClr val="000000"/>
                 </a:solidFill>
                 <a:latin typeface="Arial"/>
+                <a:ea typeface="DejaVu Sans"/>
               </a:rPr>
               <a:t> </a:t>
             </a:r>
@@ -22522,6 +22762,7 @@
                   <a:srgbClr val="666666"/>
                 </a:solidFill>
                 <a:latin typeface="Arial"/>
+                <a:ea typeface="DejaVu Sans"/>
               </a:rPr>
               <a:t>1</a:t>
             </a:r>
@@ -22531,6 +22772,7 @@
                   <a:srgbClr val="000000"/>
                 </a:solidFill>
                 <a:latin typeface="Arial"/>
+                <a:ea typeface="DejaVu Sans"/>
               </a:rPr>
               <a:t> </a:t>
             </a:r>
@@ -22540,6 +22782,7 @@
                   <a:srgbClr val="666666"/>
                 </a:solidFill>
                 <a:latin typeface="Arial"/>
+                <a:ea typeface="DejaVu Sans"/>
               </a:rPr>
               <a:t>=</a:t>
             </a:r>
@@ -22549,6 +22792,7 @@
                   <a:srgbClr val="000000"/>
                 </a:solidFill>
                 <a:latin typeface="Arial"/>
+                <a:ea typeface="DejaVu Sans"/>
               </a:rPr>
               <a:t> </a:t>
             </a:r>
@@ -22558,6 +22802,7 @@
                   <a:srgbClr val="666666"/>
                 </a:solidFill>
                 <a:latin typeface="Arial"/>
+                <a:ea typeface="DejaVu Sans"/>
               </a:rPr>
               <a:t>1</a:t>
             </a:r>
@@ -22576,7 +22821,7 @@
         <p:spPr>
           <a:xfrm>
             <a:off x="1080000" y="4022280"/>
-            <a:ext cx="1439640" cy="301680"/>
+            <a:ext cx="1439280" cy="301320"/>
           </a:xfrm>
           <a:prstGeom prst="rect">
             <a:avLst/>
@@ -22608,6 +22853,7 @@
                   <a:srgbClr val="666666"/>
                 </a:solidFill>
                 <a:latin typeface="Arial"/>
+                <a:ea typeface="DejaVu Sans"/>
               </a:rPr>
               <a:t>=</a:t>
             </a:r>
@@ -22617,6 +22863,7 @@
                   <a:srgbClr val="000000"/>
                 </a:solidFill>
                 <a:latin typeface="Arial"/>
+                <a:ea typeface="DejaVu Sans"/>
               </a:rPr>
               <a:t> chunks[</a:t>
             </a:r>
@@ -22626,6 +22873,7 @@
                   <a:srgbClr val="666666"/>
                 </a:solidFill>
                 <a:latin typeface="Arial"/>
+                <a:ea typeface="DejaVu Sans"/>
               </a:rPr>
               <a:t>0</a:t>
             </a:r>
@@ -22635,6 +22883,7 @@
                   <a:srgbClr val="000000"/>
                 </a:solidFill>
                 <a:latin typeface="Arial"/>
+                <a:ea typeface="DejaVu Sans"/>
               </a:rPr>
               <a:t>][</a:t>
             </a:r>
@@ -22644,6 +22893,7 @@
                   <a:srgbClr val="666666"/>
                 </a:solidFill>
                 <a:latin typeface="Arial"/>
+                <a:ea typeface="DejaVu Sans"/>
               </a:rPr>
               <a:t>1</a:t>
             </a:r>
@@ -22653,6 +22903,7 @@
                   <a:srgbClr val="000000"/>
                 </a:solidFill>
                 <a:latin typeface="Arial"/>
+                <a:ea typeface="DejaVu Sans"/>
               </a:rPr>
               <a:t>]</a:t>
             </a:r>
@@ -22671,7 +22922,7 @@
         <p:spPr>
           <a:xfrm>
             <a:off x="2340000" y="4022640"/>
-            <a:ext cx="1439640" cy="301680"/>
+            <a:ext cx="1439280" cy="301320"/>
           </a:xfrm>
           <a:prstGeom prst="rect">
             <a:avLst/>
@@ -22703,6 +22954,7 @@
                   <a:srgbClr val="666666"/>
                 </a:solidFill>
                 <a:latin typeface="Arial"/>
+                <a:ea typeface="DejaVu Sans"/>
               </a:rPr>
               <a:t>=</a:t>
             </a:r>
@@ -22712,6 +22964,7 @@
                   <a:srgbClr val="000000"/>
                 </a:solidFill>
                 <a:latin typeface="Arial"/>
+                <a:ea typeface="DejaVu Sans"/>
               </a:rPr>
               <a:t> </a:t>
             </a:r>
@@ -22721,6 +22974,7 @@
                   <a:srgbClr val="666666"/>
                 </a:solidFill>
                 <a:latin typeface="Arial"/>
+                <a:ea typeface="DejaVu Sans"/>
               </a:rPr>
               <a:t>-1</a:t>
             </a:r>
@@ -22766,7 +23020,7 @@
         <p:spPr>
           <a:xfrm>
             <a:off x="4320000" y="4017960"/>
-            <a:ext cx="1259640" cy="301680"/>
+            <a:ext cx="1259280" cy="301320"/>
           </a:xfrm>
           <a:prstGeom prst="rect">
             <a:avLst/>
@@ -22798,6 +23052,7 @@
                   <a:srgbClr val="000000"/>
                 </a:solidFill>
                 <a:latin typeface="Arial"/>
+                <a:ea typeface="DejaVu Sans"/>
               </a:rPr>
               <a:t>myDeque[</a:t>
             </a:r>
@@ -22807,6 +23062,7 @@
                   <a:srgbClr val="666666"/>
                 </a:solidFill>
                 <a:latin typeface="Arial"/>
+                <a:ea typeface="DejaVu Sans"/>
               </a:rPr>
               <a:t>3</a:t>
             </a:r>
@@ -22816,6 +23072,7 @@
                   <a:srgbClr val="000000"/>
                 </a:solidFill>
                 <a:latin typeface="Arial"/>
+                <a:ea typeface="DejaVu Sans"/>
               </a:rPr>
               <a:t>]</a:t>
             </a:r>
@@ -22834,7 +23091,7 @@
         <p:spPr>
           <a:xfrm>
             <a:off x="5400000" y="4017960"/>
-            <a:ext cx="1439640" cy="301680"/>
+            <a:ext cx="1439280" cy="301320"/>
           </a:xfrm>
           <a:prstGeom prst="rect">
             <a:avLst/>
@@ -22866,6 +23123,7 @@
                   <a:srgbClr val="666666"/>
                 </a:solidFill>
                 <a:latin typeface="Arial"/>
+                <a:ea typeface="DejaVu Sans"/>
               </a:rPr>
               <a:t>=</a:t>
             </a:r>
@@ -22875,6 +23133,7 @@
                   <a:srgbClr val="000000"/>
                 </a:solidFill>
                 <a:latin typeface="Arial"/>
+                <a:ea typeface="DejaVu Sans"/>
               </a:rPr>
               <a:t> chunks[</a:t>
             </a:r>
@@ -22884,6 +23143,7 @@
                   <a:srgbClr val="666666"/>
                 </a:solidFill>
                 <a:latin typeface="Arial"/>
+                <a:ea typeface="DejaVu Sans"/>
               </a:rPr>
               <a:t>1</a:t>
             </a:r>
@@ -22893,6 +23153,7 @@
                   <a:srgbClr val="000000"/>
                 </a:solidFill>
                 <a:latin typeface="Arial"/>
+                <a:ea typeface="DejaVu Sans"/>
               </a:rPr>
               <a:t>][</a:t>
             </a:r>
@@ -22902,6 +23163,7 @@
                   <a:srgbClr val="666666"/>
                 </a:solidFill>
                 <a:latin typeface="Arial"/>
+                <a:ea typeface="DejaVu Sans"/>
               </a:rPr>
               <a:t>1</a:t>
             </a:r>
@@ -22911,6 +23173,7 @@
                   <a:srgbClr val="000000"/>
                 </a:solidFill>
                 <a:latin typeface="Arial"/>
+                <a:ea typeface="DejaVu Sans"/>
               </a:rPr>
               <a:t>]</a:t>
             </a:r>
@@ -22929,7 +23192,7 @@
         <p:spPr>
           <a:xfrm>
             <a:off x="6660000" y="4017960"/>
-            <a:ext cx="1439640" cy="301680"/>
+            <a:ext cx="1439280" cy="301320"/>
           </a:xfrm>
           <a:prstGeom prst="rect">
             <a:avLst/>
@@ -22961,6 +23224,7 @@
                   <a:srgbClr val="666666"/>
                 </a:solidFill>
                 <a:latin typeface="Arial"/>
+                <a:ea typeface="DejaVu Sans"/>
               </a:rPr>
               <a:t>=</a:t>
             </a:r>
@@ -22970,6 +23234,7 @@
                   <a:srgbClr val="000000"/>
                 </a:solidFill>
                 <a:latin typeface="Arial"/>
+                <a:ea typeface="DejaVu Sans"/>
               </a:rPr>
               <a:t> </a:t>
             </a:r>
@@ -22979,6 +23244,7 @@
                   <a:srgbClr val="666666"/>
                 </a:solidFill>
                 <a:latin typeface="Arial"/>
+                <a:ea typeface="DejaVu Sans"/>
               </a:rPr>
               <a:t>2</a:t>
             </a:r>
@@ -22997,7 +23263,7 @@
         <p:spPr>
           <a:xfrm>
             <a:off x="4320000" y="4324320"/>
-            <a:ext cx="3779640" cy="355320"/>
+            <a:ext cx="3779280" cy="354960"/>
           </a:xfrm>
           <a:prstGeom prst="rect">
             <a:avLst/>
@@ -23029,6 +23295,7 @@
                   <a:srgbClr val="000000"/>
                 </a:solidFill>
                 <a:latin typeface="Arial"/>
+                <a:ea typeface="DejaVu Sans"/>
               </a:rPr>
               <a:t>chunk_idx </a:t>
             </a:r>
@@ -23038,6 +23305,7 @@
                   <a:srgbClr val="666666"/>
                 </a:solidFill>
                 <a:latin typeface="Arial"/>
+                <a:ea typeface="DejaVu Sans"/>
               </a:rPr>
               <a:t>=</a:t>
             </a:r>
@@ -23047,6 +23315,7 @@
                   <a:srgbClr val="000000"/>
                 </a:solidFill>
                 <a:latin typeface="Arial"/>
+                <a:ea typeface="DejaVu Sans"/>
               </a:rPr>
               <a:t> (</a:t>
             </a:r>
@@ -23056,6 +23325,7 @@
                   <a:srgbClr val="666666"/>
                 </a:solidFill>
                 <a:latin typeface="Arial"/>
+                <a:ea typeface="DejaVu Sans"/>
               </a:rPr>
               <a:t>6</a:t>
             </a:r>
@@ -23065,6 +23335,7 @@
                   <a:srgbClr val="000000"/>
                 </a:solidFill>
                 <a:latin typeface="Arial"/>
+                <a:ea typeface="DejaVu Sans"/>
               </a:rPr>
               <a:t> </a:t>
             </a:r>
@@ -23074,6 +23345,7 @@
                   <a:srgbClr val="666666"/>
                 </a:solidFill>
                 <a:latin typeface="Arial"/>
+                <a:ea typeface="DejaVu Sans"/>
               </a:rPr>
               <a:t>+</a:t>
             </a:r>
@@ -23083,6 +23355,7 @@
                   <a:srgbClr val="000000"/>
                 </a:solidFill>
                 <a:latin typeface="Arial"/>
+                <a:ea typeface="DejaVu Sans"/>
               </a:rPr>
               <a:t> </a:t>
             </a:r>
@@ -23092,6 +23365,7 @@
                   <a:srgbClr val="666666"/>
                 </a:solidFill>
                 <a:latin typeface="Arial"/>
+                <a:ea typeface="DejaVu Sans"/>
               </a:rPr>
               <a:t>3</a:t>
             </a:r>
@@ -23101,6 +23375,7 @@
                   <a:srgbClr val="000000"/>
                 </a:solidFill>
                 <a:latin typeface="Arial"/>
+                <a:ea typeface="DejaVu Sans"/>
               </a:rPr>
               <a:t>) </a:t>
             </a:r>
@@ -23110,6 +23385,7 @@
                   <a:srgbClr val="666666"/>
                 </a:solidFill>
                 <a:latin typeface="Arial"/>
+                <a:ea typeface="DejaVu Sans"/>
               </a:rPr>
               <a:t>/</a:t>
             </a:r>
@@ -23119,6 +23395,7 @@
                   <a:srgbClr val="000000"/>
                 </a:solidFill>
                 <a:latin typeface="Arial"/>
+                <a:ea typeface="DejaVu Sans"/>
               </a:rPr>
               <a:t> </a:t>
             </a:r>
@@ -23128,6 +23405,7 @@
                   <a:srgbClr val="666666"/>
                 </a:solidFill>
                 <a:latin typeface="Arial"/>
+                <a:ea typeface="DejaVu Sans"/>
               </a:rPr>
               <a:t>8</a:t>
             </a:r>
@@ -23137,6 +23415,7 @@
                   <a:srgbClr val="000000"/>
                 </a:solidFill>
                 <a:latin typeface="Arial"/>
+                <a:ea typeface="DejaVu Sans"/>
               </a:rPr>
               <a:t> </a:t>
             </a:r>
@@ -23146,6 +23425,7 @@
                   <a:srgbClr val="666666"/>
                 </a:solidFill>
                 <a:latin typeface="Arial"/>
+                <a:ea typeface="DejaVu Sans"/>
               </a:rPr>
               <a:t>=</a:t>
             </a:r>
@@ -23155,6 +23435,7 @@
                   <a:srgbClr val="000000"/>
                 </a:solidFill>
                 <a:latin typeface="Arial"/>
+                <a:ea typeface="DejaVu Sans"/>
               </a:rPr>
               <a:t> </a:t>
             </a:r>
@@ -23164,6 +23445,7 @@
                   <a:srgbClr val="666666"/>
                 </a:solidFill>
                 <a:latin typeface="Arial"/>
+                <a:ea typeface="DejaVu Sans"/>
               </a:rPr>
               <a:t>9</a:t>
             </a:r>
@@ -23173,6 +23455,7 @@
                   <a:srgbClr val="000000"/>
                 </a:solidFill>
                 <a:latin typeface="Arial"/>
+                <a:ea typeface="DejaVu Sans"/>
               </a:rPr>
               <a:t> </a:t>
             </a:r>
@@ -23182,6 +23465,7 @@
                   <a:srgbClr val="666666"/>
                 </a:solidFill>
                 <a:latin typeface="Arial"/>
+                <a:ea typeface="DejaVu Sans"/>
               </a:rPr>
               <a:t>/</a:t>
             </a:r>
@@ -23191,6 +23475,7 @@
                   <a:srgbClr val="000000"/>
                 </a:solidFill>
                 <a:latin typeface="Arial"/>
+                <a:ea typeface="DejaVu Sans"/>
               </a:rPr>
               <a:t> </a:t>
             </a:r>
@@ -23200,6 +23485,7 @@
                   <a:srgbClr val="666666"/>
                 </a:solidFill>
                 <a:latin typeface="Arial"/>
+                <a:ea typeface="DejaVu Sans"/>
               </a:rPr>
               <a:t>8</a:t>
             </a:r>
@@ -23209,6 +23495,7 @@
                   <a:srgbClr val="000000"/>
                 </a:solidFill>
                 <a:latin typeface="Arial"/>
+                <a:ea typeface="DejaVu Sans"/>
               </a:rPr>
               <a:t> </a:t>
             </a:r>
@@ -23218,6 +23505,7 @@
                   <a:srgbClr val="666666"/>
                 </a:solidFill>
                 <a:latin typeface="Arial"/>
+                <a:ea typeface="DejaVu Sans"/>
               </a:rPr>
               <a:t>=</a:t>
             </a:r>
@@ -23227,6 +23515,7 @@
                   <a:srgbClr val="000000"/>
                 </a:solidFill>
                 <a:latin typeface="Arial"/>
+                <a:ea typeface="DejaVu Sans"/>
               </a:rPr>
               <a:t> </a:t>
             </a:r>
@@ -23236,6 +23525,7 @@
                   <a:srgbClr val="666666"/>
                 </a:solidFill>
                 <a:latin typeface="Arial"/>
+                <a:ea typeface="DejaVu Sans"/>
               </a:rPr>
               <a:t>1</a:t>
             </a:r>
@@ -23254,7 +23544,7 @@
         <p:spPr>
           <a:xfrm>
             <a:off x="4320000" y="4680000"/>
-            <a:ext cx="2339640" cy="355320"/>
+            <a:ext cx="2339280" cy="354960"/>
           </a:xfrm>
           <a:prstGeom prst="rect">
             <a:avLst/>
@@ -23286,6 +23576,7 @@
                   <a:srgbClr val="000000"/>
                 </a:solidFill>
                 <a:latin typeface="Arial"/>
+                <a:ea typeface="DejaVu Sans"/>
               </a:rPr>
               <a:t>idx </a:t>
             </a:r>
@@ -23295,6 +23586,7 @@
                   <a:srgbClr val="666666"/>
                 </a:solidFill>
                 <a:latin typeface="Arial"/>
+                <a:ea typeface="DejaVu Sans"/>
               </a:rPr>
               <a:t>=</a:t>
             </a:r>
@@ -23304,6 +23596,7 @@
                   <a:srgbClr val="000000"/>
                 </a:solidFill>
                 <a:latin typeface="Arial"/>
+                <a:ea typeface="DejaVu Sans"/>
               </a:rPr>
               <a:t> (</a:t>
             </a:r>
@@ -23313,6 +23606,7 @@
                   <a:srgbClr val="666666"/>
                 </a:solidFill>
                 <a:latin typeface="Arial"/>
+                <a:ea typeface="DejaVu Sans"/>
               </a:rPr>
               <a:t>6</a:t>
             </a:r>
@@ -23322,6 +23616,7 @@
                   <a:srgbClr val="000000"/>
                 </a:solidFill>
                 <a:latin typeface="Arial"/>
+                <a:ea typeface="DejaVu Sans"/>
               </a:rPr>
               <a:t> </a:t>
             </a:r>
@@ -23331,6 +23626,7 @@
                   <a:srgbClr val="666666"/>
                 </a:solidFill>
                 <a:latin typeface="Arial"/>
+                <a:ea typeface="DejaVu Sans"/>
               </a:rPr>
               <a:t>+</a:t>
             </a:r>
@@ -23340,6 +23636,7 @@
                   <a:srgbClr val="000000"/>
                 </a:solidFill>
                 <a:latin typeface="Arial"/>
+                <a:ea typeface="DejaVu Sans"/>
               </a:rPr>
               <a:t> </a:t>
             </a:r>
@@ -23349,6 +23646,7 @@
                   <a:srgbClr val="666666"/>
                 </a:solidFill>
                 <a:latin typeface="Arial"/>
+                <a:ea typeface="DejaVu Sans"/>
               </a:rPr>
               <a:t>3</a:t>
             </a:r>
@@ -23358,6 +23656,7 @@
                   <a:srgbClr val="000000"/>
                 </a:solidFill>
                 <a:latin typeface="Arial"/>
+                <a:ea typeface="DejaVu Sans"/>
               </a:rPr>
               <a:t>) </a:t>
             </a:r>
@@ -23367,6 +23666,7 @@
                   <a:srgbClr val="666666"/>
                 </a:solidFill>
                 <a:latin typeface="Arial"/>
+                <a:ea typeface="DejaVu Sans"/>
               </a:rPr>
               <a:t>%</a:t>
             </a:r>
@@ -23376,6 +23676,7 @@
                   <a:srgbClr val="000000"/>
                 </a:solidFill>
                 <a:latin typeface="Arial"/>
+                <a:ea typeface="DejaVu Sans"/>
               </a:rPr>
               <a:t> </a:t>
             </a:r>
@@ -23385,6 +23686,7 @@
                   <a:srgbClr val="666666"/>
                 </a:solidFill>
                 <a:latin typeface="Arial"/>
+                <a:ea typeface="DejaVu Sans"/>
               </a:rPr>
               <a:t>8</a:t>
             </a:r>
@@ -23394,6 +23696,7 @@
                   <a:srgbClr val="000000"/>
                 </a:solidFill>
                 <a:latin typeface="Arial"/>
+                <a:ea typeface="DejaVu Sans"/>
               </a:rPr>
               <a:t> </a:t>
             </a:r>
@@ -23403,6 +23706,7 @@
                   <a:srgbClr val="666666"/>
                 </a:solidFill>
                 <a:latin typeface="Arial"/>
+                <a:ea typeface="DejaVu Sans"/>
               </a:rPr>
               <a:t>=</a:t>
             </a:r>
@@ -23412,6 +23716,7 @@
                   <a:srgbClr val="000000"/>
                 </a:solidFill>
                 <a:latin typeface="Arial"/>
+                <a:ea typeface="DejaVu Sans"/>
               </a:rPr>
               <a:t> </a:t>
             </a:r>
@@ -23421,6 +23726,7 @@
                   <a:srgbClr val="666666"/>
                 </a:solidFill>
                 <a:latin typeface="Arial"/>
+                <a:ea typeface="DejaVu Sans"/>
               </a:rPr>
               <a:t>1</a:t>
             </a:r>
@@ -23430,6 +23736,7 @@
                   <a:srgbClr val="000000"/>
                 </a:solidFill>
                 <a:latin typeface="Arial"/>
+                <a:ea typeface="DejaVu Sans"/>
               </a:rPr>
               <a:t>;</a:t>
             </a:r>
@@ -24346,7 +24653,7 @@
         <p:spPr>
           <a:xfrm>
             <a:off x="1440000" y="1239120"/>
-            <a:ext cx="7558920" cy="741600"/>
+            <a:ext cx="7558560" cy="741240"/>
           </a:xfrm>
           <a:prstGeom prst="rect">
             <a:avLst/>
@@ -24431,7 +24738,7 @@
         <p:spPr>
           <a:xfrm>
             <a:off x="0" y="0"/>
-            <a:ext cx="8638920" cy="741600"/>
+            <a:ext cx="8638560" cy="741240"/>
           </a:xfrm>
           <a:prstGeom prst="rect">
             <a:avLst/>
@@ -24482,7 +24789,7 @@
         <p:spPr>
           <a:xfrm>
             <a:off x="180000" y="1080000"/>
-            <a:ext cx="8638920" cy="857160"/>
+            <a:ext cx="8638560" cy="856800"/>
           </a:xfrm>
           <a:prstGeom prst="rect">
             <a:avLst/>
@@ -24536,7 +24843,37 @@
                 <a:latin typeface="Arial"/>
                 <a:ea typeface="DejaVu Sans"/>
               </a:rPr>
-              <a:t>англ. deque — double ended queue; двусторонняя очередь) — абстрактный тип данных, в котором элементы можно добавлять и удалять как в начало, так и в конец</a:t>
+              <a:t>англ. </a:t>
+            </a:r>
+            <a:r>
+              <a:rPr b="0" lang="ru-RU" sz="1800" spc="-1" strike="noStrike">
+                <a:solidFill>
+                  <a:srgbClr val="000000"/>
+                </a:solidFill>
+                <a:latin typeface="Arial"/>
+                <a:ea typeface="DejaVu Sans"/>
+              </a:rPr>
+              <a:t>deque</a:t>
+            </a:r>
+            <a:r>
+              <a:rPr b="0" lang="ru-RU" sz="1800" spc="-1" strike="noStrike">
+                <a:solidFill>
+                  <a:srgbClr val="55308d"/>
+                </a:solidFill>
+                <a:latin typeface="Arial"/>
+                <a:ea typeface="DejaVu Sans"/>
+              </a:rPr>
+              <a:t> </a:t>
+            </a:r>
+            <a:r>
+              <a:rPr b="0" lang="ru-RU" sz="1800" spc="-1" strike="noStrike">
+                <a:solidFill>
+                  <a:srgbClr val="000000"/>
+                </a:solidFill>
+                <a:latin typeface="Arial"/>
+                <a:ea typeface="DejaVu Sans"/>
+              </a:rPr>
+              <a:t>— double ended queue; двусторонняя очередь) — абстрактный тип данных, в котором элементы можно добавлять и удалять как в начало, так и в конец</a:t>
             </a:r>
             <a:endParaRPr b="0" lang="ru-RU" sz="1800" spc="-1" strike="noStrike">
               <a:latin typeface="Arial"/>
@@ -24557,7 +24894,7 @@
         <p:spPr>
           <a:xfrm>
             <a:off x="0" y="2700000"/>
-            <a:ext cx="9142560" cy="2116080"/>
+            <a:ext cx="9142200" cy="2115720"/>
           </a:xfrm>
           <a:prstGeom prst="rect">
             <a:avLst/>
@@ -24610,7 +24947,7 @@
         <p:spPr>
           <a:xfrm>
             <a:off x="0" y="117720"/>
-            <a:ext cx="8638920" cy="601200"/>
+            <a:ext cx="8638560" cy="600840"/>
           </a:xfrm>
           <a:prstGeom prst="rect">
             <a:avLst/>
@@ -24688,7 +25025,7 @@
         <p:spPr>
           <a:xfrm>
             <a:off x="0" y="1080000"/>
-            <a:ext cx="4498920" cy="345240"/>
+            <a:ext cx="4498560" cy="344880"/>
           </a:xfrm>
           <a:prstGeom prst="rect">
             <a:avLst/>
@@ -24739,7 +25076,7 @@
         <p:spPr>
           <a:xfrm>
             <a:off x="4860000" y="1800000"/>
-            <a:ext cx="179640" cy="345240"/>
+            <a:ext cx="179280" cy="344880"/>
           </a:xfrm>
           <a:prstGeom prst="rect">
             <a:avLst/>
@@ -24765,7 +25102,7 @@
         <p:spPr>
           <a:xfrm>
             <a:off x="4644000" y="1093680"/>
-            <a:ext cx="4498920" cy="345240"/>
+            <a:ext cx="4498560" cy="344880"/>
           </a:xfrm>
           <a:prstGeom prst="rect">
             <a:avLst/>
@@ -24816,7 +25153,7 @@
         <p:spPr>
           <a:xfrm>
             <a:off x="0" y="1620000"/>
-            <a:ext cx="4498920" cy="3522600"/>
+            <a:ext cx="4498560" cy="3522240"/>
           </a:xfrm>
           <a:prstGeom prst="rect">
             <a:avLst/>
@@ -24997,7 +25334,7 @@
         <p:spPr>
           <a:xfrm>
             <a:off x="4500000" y="1620000"/>
-            <a:ext cx="4642920" cy="3522600"/>
+            <a:ext cx="4642560" cy="3522240"/>
           </a:xfrm>
           <a:prstGeom prst="rect">
             <a:avLst/>
@@ -25562,7 +25899,7 @@
         <p:spPr>
           <a:xfrm>
             <a:off x="2340000" y="2520000"/>
-            <a:ext cx="179640" cy="345240"/>
+            <a:ext cx="179280" cy="344880"/>
           </a:xfrm>
           <a:prstGeom prst="rect">
             <a:avLst/>
@@ -25588,7 +25925,7 @@
         <p:spPr>
           <a:xfrm>
             <a:off x="1440000" y="1260000"/>
-            <a:ext cx="179640" cy="345240"/>
+            <a:ext cx="179280" cy="344880"/>
           </a:xfrm>
           <a:prstGeom prst="rect">
             <a:avLst/>
@@ -25614,7 +25951,7 @@
         <p:spPr>
           <a:xfrm>
             <a:off x="1440000" y="1237320"/>
-            <a:ext cx="7558920" cy="741600"/>
+            <a:ext cx="7558560" cy="741240"/>
           </a:xfrm>
           <a:prstGeom prst="rect">
             <a:avLst/>
@@ -25665,7 +26002,7 @@
         <p:spPr>
           <a:xfrm>
             <a:off x="5580000" y="2160000"/>
-            <a:ext cx="179640" cy="345240"/>
+            <a:ext cx="179280" cy="344880"/>
           </a:xfrm>
           <a:prstGeom prst="rect">
             <a:avLst/>
@@ -25691,7 +26028,7 @@
         <p:spPr>
           <a:xfrm>
             <a:off x="2857320" y="2160000"/>
-            <a:ext cx="179640" cy="345240"/>
+            <a:ext cx="179280" cy="344880"/>
           </a:xfrm>
           <a:prstGeom prst="rect">
             <a:avLst/>
@@ -25717,7 +26054,7 @@
         <p:spPr>
           <a:xfrm>
             <a:off x="4500000" y="3960000"/>
-            <a:ext cx="179640" cy="345240"/>
+            <a:ext cx="179280" cy="344880"/>
           </a:xfrm>
           <a:prstGeom prst="rect">
             <a:avLst/>
@@ -25777,7 +26114,7 @@
         <p:spPr>
           <a:xfrm>
             <a:off x="180000" y="180000"/>
-            <a:ext cx="3958920" cy="345240"/>
+            <a:ext cx="3958560" cy="344880"/>
           </a:xfrm>
           <a:prstGeom prst="rect">
             <a:avLst/>
@@ -25803,7 +26140,7 @@
         <p:spPr>
           <a:xfrm>
             <a:off x="0" y="0"/>
-            <a:ext cx="6838920" cy="741600"/>
+            <a:ext cx="6838560" cy="741240"/>
           </a:xfrm>
           <a:prstGeom prst="rect">
             <a:avLst/>
@@ -25854,7 +26191,7 @@
         <p:spPr>
           <a:xfrm>
             <a:off x="180000" y="1093680"/>
-            <a:ext cx="8818920" cy="857160"/>
+            <a:ext cx="8818560" cy="856800"/>
           </a:xfrm>
           <a:prstGeom prst="rect">
             <a:avLst/>
@@ -25943,7 +26280,7 @@
         <p:spPr>
           <a:xfrm>
             <a:off x="3354120" y="720"/>
-            <a:ext cx="2435040" cy="5142240"/>
+            <a:ext cx="2434680" cy="5141880"/>
           </a:xfrm>
           <a:prstGeom prst="rect">
             <a:avLst/>
@@ -25996,7 +26333,7 @@
         <p:spPr>
           <a:xfrm>
             <a:off x="3353760" y="0"/>
-            <a:ext cx="2435400" cy="5142600"/>
+            <a:ext cx="2435040" cy="5142240"/>
           </a:xfrm>
           <a:prstGeom prst="rect">
             <a:avLst/>
@@ -26049,7 +26386,7 @@
         <p:spPr>
           <a:xfrm>
             <a:off x="3052800" y="0"/>
-            <a:ext cx="3036960" cy="5142600"/>
+            <a:ext cx="3036600" cy="5142240"/>
           </a:xfrm>
           <a:prstGeom prst="rect">
             <a:avLst/>

</xml_diff>